<commit_message>
Draft of poster.  I had slacked it to you but I wasn't sure if you had seen it or not.
</commit_message>
<xml_diff>
--- a/GrovesImagesWithData.pptx
+++ b/GrovesImagesWithData.pptx
@@ -2,7 +2,7 @@
 <file path=ppt/presentation.xml><?xml version="1.0" encoding="utf-8"?>
 <p:presentation xmlns:a="http://schemas.openxmlformats.org/drawingml/2006/main" xmlns:r="http://schemas.openxmlformats.org/officeDocument/2006/relationships" xmlns:p="http://schemas.openxmlformats.org/presentationml/2006/main" saveSubsetFonts="1">
   <p:sldMasterIdLst>
-    <p:sldMasterId id="2147483648" r:id="rId1"/>
+    <p:sldMasterId id="2147483660" r:id="rId1"/>
   </p:sldMasterIdLst>
   <p:sldIdLst>
     <p:sldId id="256" r:id="rId2"/>
@@ -10,13 +10,13 @@
     <p:sldId id="258" r:id="rId4"/>
     <p:sldId id="259" r:id="rId5"/>
   </p:sldIdLst>
-  <p:sldSz cx="12192000" cy="6858000"/>
+  <p:sldSz cx="9753600" cy="7315200"/>
   <p:notesSz cx="6858000" cy="9144000"/>
   <p:defaultTextStyle>
     <a:defPPr>
       <a:defRPr lang="en-US"/>
     </a:defPPr>
-    <a:lvl1pPr marL="0" algn="l" defTabSz="914400" rtl="0" eaLnBrk="1" latinLnBrk="0" hangingPunct="1">
+    <a:lvl1pPr marL="0" algn="l" defTabSz="457200" rtl="0" eaLnBrk="1" latinLnBrk="0" hangingPunct="1">
       <a:defRPr sz="1800" kern="1200">
         <a:solidFill>
           <a:schemeClr val="tx1"/>
@@ -26,7 +26,7 @@
         <a:cs typeface="+mn-cs"/>
       </a:defRPr>
     </a:lvl1pPr>
-    <a:lvl2pPr marL="457200" algn="l" defTabSz="914400" rtl="0" eaLnBrk="1" latinLnBrk="0" hangingPunct="1">
+    <a:lvl2pPr marL="457200" algn="l" defTabSz="457200" rtl="0" eaLnBrk="1" latinLnBrk="0" hangingPunct="1">
       <a:defRPr sz="1800" kern="1200">
         <a:solidFill>
           <a:schemeClr val="tx1"/>
@@ -36,7 +36,7 @@
         <a:cs typeface="+mn-cs"/>
       </a:defRPr>
     </a:lvl2pPr>
-    <a:lvl3pPr marL="914400" algn="l" defTabSz="914400" rtl="0" eaLnBrk="1" latinLnBrk="0" hangingPunct="1">
+    <a:lvl3pPr marL="914400" algn="l" defTabSz="457200" rtl="0" eaLnBrk="1" latinLnBrk="0" hangingPunct="1">
       <a:defRPr sz="1800" kern="1200">
         <a:solidFill>
           <a:schemeClr val="tx1"/>
@@ -46,7 +46,7 @@
         <a:cs typeface="+mn-cs"/>
       </a:defRPr>
     </a:lvl3pPr>
-    <a:lvl4pPr marL="1371600" algn="l" defTabSz="914400" rtl="0" eaLnBrk="1" latinLnBrk="0" hangingPunct="1">
+    <a:lvl4pPr marL="1371600" algn="l" defTabSz="457200" rtl="0" eaLnBrk="1" latinLnBrk="0" hangingPunct="1">
       <a:defRPr sz="1800" kern="1200">
         <a:solidFill>
           <a:schemeClr val="tx1"/>
@@ -56,7 +56,7 @@
         <a:cs typeface="+mn-cs"/>
       </a:defRPr>
     </a:lvl4pPr>
-    <a:lvl5pPr marL="1828800" algn="l" defTabSz="914400" rtl="0" eaLnBrk="1" latinLnBrk="0" hangingPunct="1">
+    <a:lvl5pPr marL="1828800" algn="l" defTabSz="457200" rtl="0" eaLnBrk="1" latinLnBrk="0" hangingPunct="1">
       <a:defRPr sz="1800" kern="1200">
         <a:solidFill>
           <a:schemeClr val="tx1"/>
@@ -66,7 +66,7 @@
         <a:cs typeface="+mn-cs"/>
       </a:defRPr>
     </a:lvl5pPr>
-    <a:lvl6pPr marL="2286000" algn="l" defTabSz="914400" rtl="0" eaLnBrk="1" latinLnBrk="0" hangingPunct="1">
+    <a:lvl6pPr marL="2286000" algn="l" defTabSz="457200" rtl="0" eaLnBrk="1" latinLnBrk="0" hangingPunct="1">
       <a:defRPr sz="1800" kern="1200">
         <a:solidFill>
           <a:schemeClr val="tx1"/>
@@ -76,7 +76,7 @@
         <a:cs typeface="+mn-cs"/>
       </a:defRPr>
     </a:lvl6pPr>
-    <a:lvl7pPr marL="2743200" algn="l" defTabSz="914400" rtl="0" eaLnBrk="1" latinLnBrk="0" hangingPunct="1">
+    <a:lvl7pPr marL="2743200" algn="l" defTabSz="457200" rtl="0" eaLnBrk="1" latinLnBrk="0" hangingPunct="1">
       <a:defRPr sz="1800" kern="1200">
         <a:solidFill>
           <a:schemeClr val="tx1"/>
@@ -86,7 +86,7 @@
         <a:cs typeface="+mn-cs"/>
       </a:defRPr>
     </a:lvl7pPr>
-    <a:lvl8pPr marL="3200400" algn="l" defTabSz="914400" rtl="0" eaLnBrk="1" latinLnBrk="0" hangingPunct="1">
+    <a:lvl8pPr marL="3200400" algn="l" defTabSz="457200" rtl="0" eaLnBrk="1" latinLnBrk="0" hangingPunct="1">
       <a:defRPr sz="1800" kern="1200">
         <a:solidFill>
           <a:schemeClr val="tx1"/>
@@ -96,7 +96,7 @@
         <a:cs typeface="+mn-cs"/>
       </a:defRPr>
     </a:lvl8pPr>
-    <a:lvl9pPr marL="3657600" algn="l" defTabSz="914400" rtl="0" eaLnBrk="1" latinLnBrk="0" hangingPunct="1">
+    <a:lvl9pPr marL="3657600" algn="l" defTabSz="457200" rtl="0" eaLnBrk="1" latinLnBrk="0" hangingPunct="1">
       <a:defRPr sz="1800" kern="1200">
         <a:solidFill>
           <a:schemeClr val="tx1"/>
@@ -110,12 +110,12 @@
   <p:extLst>
     <p:ext uri="{EFAFB233-063F-42B5-8137-9DF3F51BA10A}">
       <p15:sldGuideLst xmlns:p15="http://schemas.microsoft.com/office/powerpoint/2012/main">
-        <p15:guide id="1" orient="horz" pos="2160" userDrawn="1">
+        <p15:guide id="1" orient="horz" pos="2304" userDrawn="1">
           <p15:clr>
             <a:srgbClr val="A4A3A4"/>
           </p15:clr>
         </p15:guide>
-        <p15:guide id="2" pos="3840" userDrawn="1">
+        <p15:guide id="2" pos="3072" userDrawn="1">
           <p15:clr>
             <a:srgbClr val="A4A3A4"/>
           </p15:clr>
@@ -155,15 +155,15 @@
         </p:nvSpPr>
         <p:spPr>
           <a:xfrm>
-            <a:off x="1524000" y="1122363"/>
-            <a:ext cx="9144000" cy="2387600"/>
+            <a:off x="731520" y="1197187"/>
+            <a:ext cx="8290560" cy="2546773"/>
           </a:xfrm>
         </p:spPr>
         <p:txBody>
           <a:bodyPr anchor="b"/>
           <a:lstStyle>
             <a:lvl1pPr algn="ctr">
-              <a:defRPr sz="6000"/>
+              <a:defRPr sz="6400"/>
             </a:lvl1pPr>
           </a:lstStyle>
           <a:p>
@@ -171,7 +171,7 @@
               <a:rPr lang="en-US"/>
               <a:t>Click to edit Master title style</a:t>
             </a:r>
-            <a:endParaRPr lang="en-US"/>
+            <a:endParaRPr lang="en-US" dirty="0"/>
           </a:p>
         </p:txBody>
       </p:sp>
@@ -187,8 +187,8 @@
         </p:nvSpPr>
         <p:spPr>
           <a:xfrm>
-            <a:off x="1524000" y="3602038"/>
-            <a:ext cx="9144000" cy="1655762"/>
+            <a:off x="1219200" y="3842174"/>
+            <a:ext cx="7315200" cy="1766146"/>
           </a:xfrm>
         </p:spPr>
         <p:txBody>
@@ -196,39 +196,39 @@
           <a:lstStyle>
             <a:lvl1pPr marL="0" indent="0" algn="ctr">
               <a:buNone/>
-              <a:defRPr sz="2400"/>
+              <a:defRPr sz="2560"/>
             </a:lvl1pPr>
-            <a:lvl2pPr marL="457200" indent="0" algn="ctr">
-              <a:buNone/>
-              <a:defRPr sz="2000"/>
+            <a:lvl2pPr marL="487695" indent="0" algn="ctr">
+              <a:buNone/>
+              <a:defRPr sz="2133"/>
             </a:lvl2pPr>
-            <a:lvl3pPr marL="914400" indent="0" algn="ctr">
-              <a:buNone/>
-              <a:defRPr sz="1800"/>
+            <a:lvl3pPr marL="975390" indent="0" algn="ctr">
+              <a:buNone/>
+              <a:defRPr sz="1920"/>
             </a:lvl3pPr>
-            <a:lvl4pPr marL="1371600" indent="0" algn="ctr">
-              <a:buNone/>
-              <a:defRPr sz="1600"/>
+            <a:lvl4pPr marL="1463086" indent="0" algn="ctr">
+              <a:buNone/>
+              <a:defRPr sz="1707"/>
             </a:lvl4pPr>
-            <a:lvl5pPr marL="1828800" indent="0" algn="ctr">
-              <a:buNone/>
-              <a:defRPr sz="1600"/>
+            <a:lvl5pPr marL="1950781" indent="0" algn="ctr">
+              <a:buNone/>
+              <a:defRPr sz="1707"/>
             </a:lvl5pPr>
-            <a:lvl6pPr marL="2286000" indent="0" algn="ctr">
-              <a:buNone/>
-              <a:defRPr sz="1600"/>
+            <a:lvl6pPr marL="2438476" indent="0" algn="ctr">
+              <a:buNone/>
+              <a:defRPr sz="1707"/>
             </a:lvl6pPr>
-            <a:lvl7pPr marL="2743200" indent="0" algn="ctr">
-              <a:buNone/>
-              <a:defRPr sz="1600"/>
+            <a:lvl7pPr marL="2926171" indent="0" algn="ctr">
+              <a:buNone/>
+              <a:defRPr sz="1707"/>
             </a:lvl7pPr>
-            <a:lvl8pPr marL="3200400" indent="0" algn="ctr">
-              <a:buNone/>
-              <a:defRPr sz="1600"/>
+            <a:lvl8pPr marL="3413867" indent="0" algn="ctr">
+              <a:buNone/>
+              <a:defRPr sz="1707"/>
             </a:lvl8pPr>
-            <a:lvl9pPr marL="3657600" indent="0" algn="ctr">
-              <a:buNone/>
-              <a:defRPr sz="1600"/>
+            <a:lvl9pPr marL="3901562" indent="0" algn="ctr">
+              <a:buNone/>
+              <a:defRPr sz="1707"/>
             </a:lvl9pPr>
           </a:lstStyle>
           <a:p>
@@ -236,7 +236,7 @@
               <a:rPr lang="en-US"/>
               <a:t>Click to edit Master subtitle style</a:t>
             </a:r>
-            <a:endParaRPr lang="en-US"/>
+            <a:endParaRPr lang="en-US" dirty="0"/>
           </a:p>
         </p:txBody>
       </p:sp>
@@ -308,7 +308,7 @@
     </p:spTree>
     <p:extLst>
       <p:ext uri="{BB962C8B-B14F-4D97-AF65-F5344CB8AC3E}">
-        <p14:creationId xmlns:p14="http://schemas.microsoft.com/office/powerpoint/2010/main" val="2061450736"/>
+        <p14:creationId xmlns:p14="http://schemas.microsoft.com/office/powerpoint/2010/main" val="3234420038"/>
       </p:ext>
     </p:extLst>
   </p:cSld>
@@ -354,7 +354,7 @@
               <a:rPr lang="en-US"/>
               <a:t>Click to edit Master title style</a:t>
             </a:r>
-            <a:endParaRPr lang="en-US"/>
+            <a:endParaRPr lang="en-US" dirty="0"/>
           </a:p>
         </p:txBody>
       </p:sp>
@@ -406,7 +406,7 @@
               <a:rPr lang="en-US"/>
               <a:t>Fifth level</a:t>
             </a:r>
-            <a:endParaRPr lang="en-US"/>
+            <a:endParaRPr lang="en-US" dirty="0"/>
           </a:p>
         </p:txBody>
       </p:sp>
@@ -478,7 +478,7 @@
     </p:spTree>
     <p:extLst>
       <p:ext uri="{BB962C8B-B14F-4D97-AF65-F5344CB8AC3E}">
-        <p14:creationId xmlns:p14="http://schemas.microsoft.com/office/powerpoint/2010/main" val="2041477033"/>
+        <p14:creationId xmlns:p14="http://schemas.microsoft.com/office/powerpoint/2010/main" val="2464291609"/>
       </p:ext>
     </p:extLst>
   </p:cSld>
@@ -517,8 +517,8 @@
         </p:nvSpPr>
         <p:spPr>
           <a:xfrm>
-            <a:off x="8724900" y="365125"/>
-            <a:ext cx="2628900" cy="5811838"/>
+            <a:off x="6979921" y="389467"/>
+            <a:ext cx="2103120" cy="6199294"/>
           </a:xfrm>
         </p:spPr>
         <p:txBody>
@@ -529,7 +529,7 @@
               <a:rPr lang="en-US"/>
               <a:t>Click to edit Master title style</a:t>
             </a:r>
-            <a:endParaRPr lang="en-US"/>
+            <a:endParaRPr lang="en-US" dirty="0"/>
           </a:p>
         </p:txBody>
       </p:sp>
@@ -545,8 +545,8 @@
         </p:nvSpPr>
         <p:spPr>
           <a:xfrm>
-            <a:off x="838200" y="365125"/>
-            <a:ext cx="7734300" cy="5811838"/>
+            <a:off x="670561" y="389467"/>
+            <a:ext cx="6187440" cy="6199294"/>
           </a:xfrm>
         </p:spPr>
         <p:txBody>
@@ -586,7 +586,7 @@
               <a:rPr lang="en-US"/>
               <a:t>Fifth level</a:t>
             </a:r>
-            <a:endParaRPr lang="en-US"/>
+            <a:endParaRPr lang="en-US" dirty="0"/>
           </a:p>
         </p:txBody>
       </p:sp>
@@ -658,7 +658,7 @@
     </p:spTree>
     <p:extLst>
       <p:ext uri="{BB962C8B-B14F-4D97-AF65-F5344CB8AC3E}">
-        <p14:creationId xmlns:p14="http://schemas.microsoft.com/office/powerpoint/2010/main" val="2137608350"/>
+        <p14:creationId xmlns:p14="http://schemas.microsoft.com/office/powerpoint/2010/main" val="4246190723"/>
       </p:ext>
     </p:extLst>
   </p:cSld>
@@ -704,7 +704,7 @@
               <a:rPr lang="en-US"/>
               <a:t>Click to edit Master title style</a:t>
             </a:r>
-            <a:endParaRPr lang="en-US"/>
+            <a:endParaRPr lang="en-US" dirty="0"/>
           </a:p>
         </p:txBody>
       </p:sp>
@@ -756,7 +756,7 @@
               <a:rPr lang="en-US"/>
               <a:t>Fifth level</a:t>
             </a:r>
-            <a:endParaRPr lang="en-US"/>
+            <a:endParaRPr lang="en-US" dirty="0"/>
           </a:p>
         </p:txBody>
       </p:sp>
@@ -828,7 +828,7 @@
     </p:spTree>
     <p:extLst>
       <p:ext uri="{BB962C8B-B14F-4D97-AF65-F5344CB8AC3E}">
-        <p14:creationId xmlns:p14="http://schemas.microsoft.com/office/powerpoint/2010/main" val="1814828088"/>
+        <p14:creationId xmlns:p14="http://schemas.microsoft.com/office/powerpoint/2010/main" val="3577589055"/>
       </p:ext>
     </p:extLst>
   </p:cSld>
@@ -867,15 +867,15 @@
         </p:nvSpPr>
         <p:spPr>
           <a:xfrm>
-            <a:off x="831850" y="1709738"/>
-            <a:ext cx="10515600" cy="2852737"/>
+            <a:off x="665481" y="1823722"/>
+            <a:ext cx="8412480" cy="3042919"/>
           </a:xfrm>
         </p:spPr>
         <p:txBody>
           <a:bodyPr anchor="b"/>
           <a:lstStyle>
             <a:lvl1pPr>
-              <a:defRPr sz="6000"/>
+              <a:defRPr sz="6400"/>
             </a:lvl1pPr>
           </a:lstStyle>
           <a:p>
@@ -883,7 +883,7 @@
               <a:rPr lang="en-US"/>
               <a:t>Click to edit Master title style</a:t>
             </a:r>
-            <a:endParaRPr lang="en-US"/>
+            <a:endParaRPr lang="en-US" dirty="0"/>
           </a:p>
         </p:txBody>
       </p:sp>
@@ -899,8 +899,8 @@
         </p:nvSpPr>
         <p:spPr>
           <a:xfrm>
-            <a:off x="831850" y="4589463"/>
-            <a:ext cx="10515600" cy="1500187"/>
+            <a:off x="665481" y="4895429"/>
+            <a:ext cx="8412480" cy="1600199"/>
           </a:xfrm>
         </p:spPr>
         <p:txBody>
@@ -908,17 +908,15 @@
           <a:lstStyle>
             <a:lvl1pPr marL="0" indent="0">
               <a:buNone/>
-              <a:defRPr sz="2400">
+              <a:defRPr sz="2560">
                 <a:solidFill>
-                  <a:schemeClr val="tx1">
-                    <a:tint val="75000"/>
-                  </a:schemeClr>
+                  <a:schemeClr val="tx1"/>
                 </a:solidFill>
               </a:defRPr>
             </a:lvl1pPr>
-            <a:lvl2pPr marL="457200" indent="0">
-              <a:buNone/>
-              <a:defRPr sz="2000">
+            <a:lvl2pPr marL="487695" indent="0">
+              <a:buNone/>
+              <a:defRPr sz="2133">
                 <a:solidFill>
                   <a:schemeClr val="tx1">
                     <a:tint val="75000"/>
@@ -926,9 +924,9 @@
                 </a:solidFill>
               </a:defRPr>
             </a:lvl2pPr>
-            <a:lvl3pPr marL="914400" indent="0">
-              <a:buNone/>
-              <a:defRPr sz="1800">
+            <a:lvl3pPr marL="975390" indent="0">
+              <a:buNone/>
+              <a:defRPr sz="1920">
                 <a:solidFill>
                   <a:schemeClr val="tx1">
                     <a:tint val="75000"/>
@@ -936,9 +934,9 @@
                 </a:solidFill>
               </a:defRPr>
             </a:lvl3pPr>
-            <a:lvl4pPr marL="1371600" indent="0">
-              <a:buNone/>
-              <a:defRPr sz="1600">
+            <a:lvl4pPr marL="1463086" indent="0">
+              <a:buNone/>
+              <a:defRPr sz="1707">
                 <a:solidFill>
                   <a:schemeClr val="tx1">
                     <a:tint val="75000"/>
@@ -946,9 +944,9 @@
                 </a:solidFill>
               </a:defRPr>
             </a:lvl4pPr>
-            <a:lvl5pPr marL="1828800" indent="0">
-              <a:buNone/>
-              <a:defRPr sz="1600">
+            <a:lvl5pPr marL="1950781" indent="0">
+              <a:buNone/>
+              <a:defRPr sz="1707">
                 <a:solidFill>
                   <a:schemeClr val="tx1">
                     <a:tint val="75000"/>
@@ -956,9 +954,9 @@
                 </a:solidFill>
               </a:defRPr>
             </a:lvl5pPr>
-            <a:lvl6pPr marL="2286000" indent="0">
-              <a:buNone/>
-              <a:defRPr sz="1600">
+            <a:lvl6pPr marL="2438476" indent="0">
+              <a:buNone/>
+              <a:defRPr sz="1707">
                 <a:solidFill>
                   <a:schemeClr val="tx1">
                     <a:tint val="75000"/>
@@ -966,9 +964,9 @@
                 </a:solidFill>
               </a:defRPr>
             </a:lvl6pPr>
-            <a:lvl7pPr marL="2743200" indent="0">
-              <a:buNone/>
-              <a:defRPr sz="1600">
+            <a:lvl7pPr marL="2926171" indent="0">
+              <a:buNone/>
+              <a:defRPr sz="1707">
                 <a:solidFill>
                   <a:schemeClr val="tx1">
                     <a:tint val="75000"/>
@@ -976,9 +974,9 @@
                 </a:solidFill>
               </a:defRPr>
             </a:lvl7pPr>
-            <a:lvl8pPr marL="3200400" indent="0">
-              <a:buNone/>
-              <a:defRPr sz="1600">
+            <a:lvl8pPr marL="3413867" indent="0">
+              <a:buNone/>
+              <a:defRPr sz="1707">
                 <a:solidFill>
                   <a:schemeClr val="tx1">
                     <a:tint val="75000"/>
@@ -986,9 +984,9 @@
                 </a:solidFill>
               </a:defRPr>
             </a:lvl8pPr>
-            <a:lvl9pPr marL="3657600" indent="0">
-              <a:buNone/>
-              <a:defRPr sz="1600">
+            <a:lvl9pPr marL="3901562" indent="0">
+              <a:buNone/>
+              <a:defRPr sz="1707">
                 <a:solidFill>
                   <a:schemeClr val="tx1">
                     <a:tint val="75000"/>
@@ -1074,7 +1072,7 @@
     </p:spTree>
     <p:extLst>
       <p:ext uri="{BB962C8B-B14F-4D97-AF65-F5344CB8AC3E}">
-        <p14:creationId xmlns:p14="http://schemas.microsoft.com/office/powerpoint/2010/main" val="3824580884"/>
+        <p14:creationId xmlns:p14="http://schemas.microsoft.com/office/powerpoint/2010/main" val="3131995007"/>
       </p:ext>
     </p:extLst>
   </p:cSld>
@@ -1120,7 +1118,7 @@
               <a:rPr lang="en-US"/>
               <a:t>Click to edit Master title style</a:t>
             </a:r>
-            <a:endParaRPr lang="en-US"/>
+            <a:endParaRPr lang="en-US" dirty="0"/>
           </a:p>
         </p:txBody>
       </p:sp>
@@ -1136,8 +1134,8 @@
         </p:nvSpPr>
         <p:spPr>
           <a:xfrm>
-            <a:off x="838200" y="1825625"/>
-            <a:ext cx="5181600" cy="4351338"/>
+            <a:off x="670560" y="1947333"/>
+            <a:ext cx="4145280" cy="4641427"/>
           </a:xfrm>
         </p:spPr>
         <p:txBody>
@@ -1177,7 +1175,7 @@
               <a:rPr lang="en-US"/>
               <a:t>Fifth level</a:t>
             </a:r>
-            <a:endParaRPr lang="en-US"/>
+            <a:endParaRPr lang="en-US" dirty="0"/>
           </a:p>
         </p:txBody>
       </p:sp>
@@ -1193,8 +1191,8 @@
         </p:nvSpPr>
         <p:spPr>
           <a:xfrm>
-            <a:off x="6172200" y="1825625"/>
-            <a:ext cx="5181600" cy="4351338"/>
+            <a:off x="4937760" y="1947333"/>
+            <a:ext cx="4145280" cy="4641427"/>
           </a:xfrm>
         </p:spPr>
         <p:txBody>
@@ -1234,7 +1232,7 @@
               <a:rPr lang="en-US"/>
               <a:t>Fifth level</a:t>
             </a:r>
-            <a:endParaRPr lang="en-US"/>
+            <a:endParaRPr lang="en-US" dirty="0"/>
           </a:p>
         </p:txBody>
       </p:sp>
@@ -1306,7 +1304,7 @@
     </p:spTree>
     <p:extLst>
       <p:ext uri="{BB962C8B-B14F-4D97-AF65-F5344CB8AC3E}">
-        <p14:creationId xmlns:p14="http://schemas.microsoft.com/office/powerpoint/2010/main" val="1819451101"/>
+        <p14:creationId xmlns:p14="http://schemas.microsoft.com/office/powerpoint/2010/main" val="2816088676"/>
       </p:ext>
     </p:extLst>
   </p:cSld>
@@ -1345,8 +1343,8 @@
         </p:nvSpPr>
         <p:spPr>
           <a:xfrm>
-            <a:off x="839788" y="365125"/>
-            <a:ext cx="10515600" cy="1325563"/>
+            <a:off x="671830" y="389468"/>
+            <a:ext cx="8412480" cy="1413934"/>
           </a:xfrm>
         </p:spPr>
         <p:txBody>
@@ -1357,7 +1355,7 @@
               <a:rPr lang="en-US"/>
               <a:t>Click to edit Master title style</a:t>
             </a:r>
-            <a:endParaRPr lang="en-US"/>
+            <a:endParaRPr lang="en-US" dirty="0"/>
           </a:p>
         </p:txBody>
       </p:sp>
@@ -1373,8 +1371,8 @@
         </p:nvSpPr>
         <p:spPr>
           <a:xfrm>
-            <a:off x="839788" y="1681163"/>
-            <a:ext cx="5157787" cy="823912"/>
+            <a:off x="671832" y="1793241"/>
+            <a:ext cx="4126229" cy="878839"/>
           </a:xfrm>
         </p:spPr>
         <p:txBody>
@@ -1382,39 +1380,39 @@
           <a:lstStyle>
             <a:lvl1pPr marL="0" indent="0">
               <a:buNone/>
-              <a:defRPr sz="2400" b="1"/>
+              <a:defRPr sz="2560" b="1"/>
             </a:lvl1pPr>
-            <a:lvl2pPr marL="457200" indent="0">
-              <a:buNone/>
-              <a:defRPr sz="2000" b="1"/>
+            <a:lvl2pPr marL="487695" indent="0">
+              <a:buNone/>
+              <a:defRPr sz="2133" b="1"/>
             </a:lvl2pPr>
-            <a:lvl3pPr marL="914400" indent="0">
-              <a:buNone/>
-              <a:defRPr sz="1800" b="1"/>
+            <a:lvl3pPr marL="975390" indent="0">
+              <a:buNone/>
+              <a:defRPr sz="1920" b="1"/>
             </a:lvl3pPr>
-            <a:lvl4pPr marL="1371600" indent="0">
-              <a:buNone/>
-              <a:defRPr sz="1600" b="1"/>
+            <a:lvl4pPr marL="1463086" indent="0">
+              <a:buNone/>
+              <a:defRPr sz="1707" b="1"/>
             </a:lvl4pPr>
-            <a:lvl5pPr marL="1828800" indent="0">
-              <a:buNone/>
-              <a:defRPr sz="1600" b="1"/>
+            <a:lvl5pPr marL="1950781" indent="0">
+              <a:buNone/>
+              <a:defRPr sz="1707" b="1"/>
             </a:lvl5pPr>
-            <a:lvl6pPr marL="2286000" indent="0">
-              <a:buNone/>
-              <a:defRPr sz="1600" b="1"/>
+            <a:lvl6pPr marL="2438476" indent="0">
+              <a:buNone/>
+              <a:defRPr sz="1707" b="1"/>
             </a:lvl6pPr>
-            <a:lvl7pPr marL="2743200" indent="0">
-              <a:buNone/>
-              <a:defRPr sz="1600" b="1"/>
+            <a:lvl7pPr marL="2926171" indent="0">
+              <a:buNone/>
+              <a:defRPr sz="1707" b="1"/>
             </a:lvl7pPr>
-            <a:lvl8pPr marL="3200400" indent="0">
-              <a:buNone/>
-              <a:defRPr sz="1600" b="1"/>
+            <a:lvl8pPr marL="3413867" indent="0">
+              <a:buNone/>
+              <a:defRPr sz="1707" b="1"/>
             </a:lvl8pPr>
-            <a:lvl9pPr marL="3657600" indent="0">
-              <a:buNone/>
-              <a:defRPr sz="1600" b="1"/>
+            <a:lvl9pPr marL="3901562" indent="0">
+              <a:buNone/>
+              <a:defRPr sz="1707" b="1"/>
             </a:lvl9pPr>
           </a:lstStyle>
           <a:p>
@@ -1438,8 +1436,8 @@
         </p:nvSpPr>
         <p:spPr>
           <a:xfrm>
-            <a:off x="839788" y="2505075"/>
-            <a:ext cx="5157787" cy="3684588"/>
+            <a:off x="671832" y="2672080"/>
+            <a:ext cx="4126229" cy="3930227"/>
           </a:xfrm>
         </p:spPr>
         <p:txBody>
@@ -1479,7 +1477,7 @@
               <a:rPr lang="en-US"/>
               <a:t>Fifth level</a:t>
             </a:r>
-            <a:endParaRPr lang="en-US"/>
+            <a:endParaRPr lang="en-US" dirty="0"/>
           </a:p>
         </p:txBody>
       </p:sp>
@@ -1495,8 +1493,8 @@
         </p:nvSpPr>
         <p:spPr>
           <a:xfrm>
-            <a:off x="6172200" y="1681163"/>
-            <a:ext cx="5183188" cy="823912"/>
+            <a:off x="4937761" y="1793241"/>
+            <a:ext cx="4146550" cy="878839"/>
           </a:xfrm>
         </p:spPr>
         <p:txBody>
@@ -1504,39 +1502,39 @@
           <a:lstStyle>
             <a:lvl1pPr marL="0" indent="0">
               <a:buNone/>
-              <a:defRPr sz="2400" b="1"/>
+              <a:defRPr sz="2560" b="1"/>
             </a:lvl1pPr>
-            <a:lvl2pPr marL="457200" indent="0">
-              <a:buNone/>
-              <a:defRPr sz="2000" b="1"/>
+            <a:lvl2pPr marL="487695" indent="0">
+              <a:buNone/>
+              <a:defRPr sz="2133" b="1"/>
             </a:lvl2pPr>
-            <a:lvl3pPr marL="914400" indent="0">
-              <a:buNone/>
-              <a:defRPr sz="1800" b="1"/>
+            <a:lvl3pPr marL="975390" indent="0">
+              <a:buNone/>
+              <a:defRPr sz="1920" b="1"/>
             </a:lvl3pPr>
-            <a:lvl4pPr marL="1371600" indent="0">
-              <a:buNone/>
-              <a:defRPr sz="1600" b="1"/>
+            <a:lvl4pPr marL="1463086" indent="0">
+              <a:buNone/>
+              <a:defRPr sz="1707" b="1"/>
             </a:lvl4pPr>
-            <a:lvl5pPr marL="1828800" indent="0">
-              <a:buNone/>
-              <a:defRPr sz="1600" b="1"/>
+            <a:lvl5pPr marL="1950781" indent="0">
+              <a:buNone/>
+              <a:defRPr sz="1707" b="1"/>
             </a:lvl5pPr>
-            <a:lvl6pPr marL="2286000" indent="0">
-              <a:buNone/>
-              <a:defRPr sz="1600" b="1"/>
+            <a:lvl6pPr marL="2438476" indent="0">
+              <a:buNone/>
+              <a:defRPr sz="1707" b="1"/>
             </a:lvl6pPr>
-            <a:lvl7pPr marL="2743200" indent="0">
-              <a:buNone/>
-              <a:defRPr sz="1600" b="1"/>
+            <a:lvl7pPr marL="2926171" indent="0">
+              <a:buNone/>
+              <a:defRPr sz="1707" b="1"/>
             </a:lvl7pPr>
-            <a:lvl8pPr marL="3200400" indent="0">
-              <a:buNone/>
-              <a:defRPr sz="1600" b="1"/>
+            <a:lvl8pPr marL="3413867" indent="0">
+              <a:buNone/>
+              <a:defRPr sz="1707" b="1"/>
             </a:lvl8pPr>
-            <a:lvl9pPr marL="3657600" indent="0">
-              <a:buNone/>
-              <a:defRPr sz="1600" b="1"/>
+            <a:lvl9pPr marL="3901562" indent="0">
+              <a:buNone/>
+              <a:defRPr sz="1707" b="1"/>
             </a:lvl9pPr>
           </a:lstStyle>
           <a:p>
@@ -1560,8 +1558,8 @@
         </p:nvSpPr>
         <p:spPr>
           <a:xfrm>
-            <a:off x="6172200" y="2505075"/>
-            <a:ext cx="5183188" cy="3684588"/>
+            <a:off x="4937761" y="2672080"/>
+            <a:ext cx="4146550" cy="3930227"/>
           </a:xfrm>
         </p:spPr>
         <p:txBody>
@@ -1601,7 +1599,7 @@
               <a:rPr lang="en-US"/>
               <a:t>Fifth level</a:t>
             </a:r>
-            <a:endParaRPr lang="en-US"/>
+            <a:endParaRPr lang="en-US" dirty="0"/>
           </a:p>
         </p:txBody>
       </p:sp>
@@ -1673,7 +1671,7 @@
     </p:spTree>
     <p:extLst>
       <p:ext uri="{BB962C8B-B14F-4D97-AF65-F5344CB8AC3E}">
-        <p14:creationId xmlns:p14="http://schemas.microsoft.com/office/powerpoint/2010/main" val="2435851703"/>
+        <p14:creationId xmlns:p14="http://schemas.microsoft.com/office/powerpoint/2010/main" val="3180571196"/>
       </p:ext>
     </p:extLst>
   </p:cSld>
@@ -1719,7 +1717,7 @@
               <a:rPr lang="en-US"/>
               <a:t>Click to edit Master title style</a:t>
             </a:r>
-            <a:endParaRPr lang="en-US"/>
+            <a:endParaRPr lang="en-US" dirty="0"/>
           </a:p>
         </p:txBody>
       </p:sp>
@@ -1791,7 +1789,7 @@
     </p:spTree>
     <p:extLst>
       <p:ext uri="{BB962C8B-B14F-4D97-AF65-F5344CB8AC3E}">
-        <p14:creationId xmlns:p14="http://schemas.microsoft.com/office/powerpoint/2010/main" val="4191226389"/>
+        <p14:creationId xmlns:p14="http://schemas.microsoft.com/office/powerpoint/2010/main" val="3610585603"/>
       </p:ext>
     </p:extLst>
   </p:cSld>
@@ -1886,7 +1884,7 @@
     </p:spTree>
     <p:extLst>
       <p:ext uri="{BB962C8B-B14F-4D97-AF65-F5344CB8AC3E}">
-        <p14:creationId xmlns:p14="http://schemas.microsoft.com/office/powerpoint/2010/main" val="2697921618"/>
+        <p14:creationId xmlns:p14="http://schemas.microsoft.com/office/powerpoint/2010/main" val="1552675215"/>
       </p:ext>
     </p:extLst>
   </p:cSld>
@@ -1925,15 +1923,15 @@
         </p:nvSpPr>
         <p:spPr>
           <a:xfrm>
-            <a:off x="839788" y="457200"/>
-            <a:ext cx="3932237" cy="1600200"/>
+            <a:off x="671830" y="487680"/>
+            <a:ext cx="3145790" cy="1706880"/>
           </a:xfrm>
         </p:spPr>
         <p:txBody>
           <a:bodyPr anchor="b"/>
           <a:lstStyle>
             <a:lvl1pPr>
-              <a:defRPr sz="3200"/>
+              <a:defRPr sz="3413"/>
             </a:lvl1pPr>
           </a:lstStyle>
           <a:p>
@@ -1941,7 +1939,7 @@
               <a:rPr lang="en-US"/>
               <a:t>Click to edit Master title style</a:t>
             </a:r>
-            <a:endParaRPr lang="en-US"/>
+            <a:endParaRPr lang="en-US" dirty="0"/>
           </a:p>
         </p:txBody>
       </p:sp>
@@ -1957,39 +1955,39 @@
         </p:nvSpPr>
         <p:spPr>
           <a:xfrm>
-            <a:off x="5183188" y="987425"/>
-            <a:ext cx="6172200" cy="4873625"/>
+            <a:off x="4146550" y="1053255"/>
+            <a:ext cx="4937760" cy="5198533"/>
           </a:xfrm>
         </p:spPr>
         <p:txBody>
           <a:bodyPr/>
           <a:lstStyle>
             <a:lvl1pPr>
-              <a:defRPr sz="3200"/>
+              <a:defRPr sz="3413"/>
             </a:lvl1pPr>
             <a:lvl2pPr>
-              <a:defRPr sz="2800"/>
+              <a:defRPr sz="2987"/>
             </a:lvl2pPr>
             <a:lvl3pPr>
-              <a:defRPr sz="2400"/>
+              <a:defRPr sz="2560"/>
             </a:lvl3pPr>
             <a:lvl4pPr>
-              <a:defRPr sz="2000"/>
+              <a:defRPr sz="2133"/>
             </a:lvl4pPr>
             <a:lvl5pPr>
-              <a:defRPr sz="2000"/>
+              <a:defRPr sz="2133"/>
             </a:lvl5pPr>
             <a:lvl6pPr>
-              <a:defRPr sz="2000"/>
+              <a:defRPr sz="2133"/>
             </a:lvl6pPr>
             <a:lvl7pPr>
-              <a:defRPr sz="2000"/>
+              <a:defRPr sz="2133"/>
             </a:lvl7pPr>
             <a:lvl8pPr>
-              <a:defRPr sz="2000"/>
+              <a:defRPr sz="2133"/>
             </a:lvl8pPr>
             <a:lvl9pPr>
-              <a:defRPr sz="2000"/>
+              <a:defRPr sz="2133"/>
             </a:lvl9pPr>
           </a:lstStyle>
           <a:p>
@@ -2026,7 +2024,7 @@
               <a:rPr lang="en-US"/>
               <a:t>Fifth level</a:t>
             </a:r>
-            <a:endParaRPr lang="en-US"/>
+            <a:endParaRPr lang="en-US" dirty="0"/>
           </a:p>
         </p:txBody>
       </p:sp>
@@ -2042,8 +2040,8 @@
         </p:nvSpPr>
         <p:spPr>
           <a:xfrm>
-            <a:off x="839788" y="2057400"/>
-            <a:ext cx="3932237" cy="3811588"/>
+            <a:off x="671830" y="2194560"/>
+            <a:ext cx="3145790" cy="4065694"/>
           </a:xfrm>
         </p:spPr>
         <p:txBody>
@@ -2051,39 +2049,39 @@
           <a:lstStyle>
             <a:lvl1pPr marL="0" indent="0">
               <a:buNone/>
-              <a:defRPr sz="1600"/>
+              <a:defRPr sz="1707"/>
             </a:lvl1pPr>
-            <a:lvl2pPr marL="457200" indent="0">
-              <a:buNone/>
-              <a:defRPr sz="1400"/>
+            <a:lvl2pPr marL="487695" indent="0">
+              <a:buNone/>
+              <a:defRPr sz="1493"/>
             </a:lvl2pPr>
-            <a:lvl3pPr marL="914400" indent="0">
-              <a:buNone/>
-              <a:defRPr sz="1200"/>
+            <a:lvl3pPr marL="975390" indent="0">
+              <a:buNone/>
+              <a:defRPr sz="1280"/>
             </a:lvl3pPr>
-            <a:lvl4pPr marL="1371600" indent="0">
-              <a:buNone/>
-              <a:defRPr sz="1000"/>
+            <a:lvl4pPr marL="1463086" indent="0">
+              <a:buNone/>
+              <a:defRPr sz="1067"/>
             </a:lvl4pPr>
-            <a:lvl5pPr marL="1828800" indent="0">
-              <a:buNone/>
-              <a:defRPr sz="1000"/>
+            <a:lvl5pPr marL="1950781" indent="0">
+              <a:buNone/>
+              <a:defRPr sz="1067"/>
             </a:lvl5pPr>
-            <a:lvl6pPr marL="2286000" indent="0">
-              <a:buNone/>
-              <a:defRPr sz="1000"/>
+            <a:lvl6pPr marL="2438476" indent="0">
+              <a:buNone/>
+              <a:defRPr sz="1067"/>
             </a:lvl6pPr>
-            <a:lvl7pPr marL="2743200" indent="0">
-              <a:buNone/>
-              <a:defRPr sz="1000"/>
+            <a:lvl7pPr marL="2926171" indent="0">
+              <a:buNone/>
+              <a:defRPr sz="1067"/>
             </a:lvl7pPr>
-            <a:lvl8pPr marL="3200400" indent="0">
-              <a:buNone/>
-              <a:defRPr sz="1000"/>
+            <a:lvl8pPr marL="3413867" indent="0">
+              <a:buNone/>
+              <a:defRPr sz="1067"/>
             </a:lvl8pPr>
-            <a:lvl9pPr marL="3657600" indent="0">
-              <a:buNone/>
-              <a:defRPr sz="1000"/>
+            <a:lvl9pPr marL="3901562" indent="0">
+              <a:buNone/>
+              <a:defRPr sz="1067"/>
             </a:lvl9pPr>
           </a:lstStyle>
           <a:p>
@@ -2163,7 +2161,7 @@
     </p:spTree>
     <p:extLst>
       <p:ext uri="{BB962C8B-B14F-4D97-AF65-F5344CB8AC3E}">
-        <p14:creationId xmlns:p14="http://schemas.microsoft.com/office/powerpoint/2010/main" val="936104084"/>
+        <p14:creationId xmlns:p14="http://schemas.microsoft.com/office/powerpoint/2010/main" val="67370792"/>
       </p:ext>
     </p:extLst>
   </p:cSld>
@@ -2202,15 +2200,15 @@
         </p:nvSpPr>
         <p:spPr>
           <a:xfrm>
-            <a:off x="839788" y="457200"/>
-            <a:ext cx="3932237" cy="1600200"/>
+            <a:off x="671830" y="487680"/>
+            <a:ext cx="3145790" cy="1706880"/>
           </a:xfrm>
         </p:spPr>
         <p:txBody>
           <a:bodyPr anchor="b"/>
           <a:lstStyle>
             <a:lvl1pPr>
-              <a:defRPr sz="3200"/>
+              <a:defRPr sz="3413"/>
             </a:lvl1pPr>
           </a:lstStyle>
           <a:p>
@@ -2218,7 +2216,7 @@
               <a:rPr lang="en-US"/>
               <a:t>Click to edit Master title style</a:t>
             </a:r>
-            <a:endParaRPr lang="en-US"/>
+            <a:endParaRPr lang="en-US" dirty="0"/>
           </a:p>
         </p:txBody>
       </p:sp>
@@ -2226,7 +2224,7 @@
         <p:nvSpPr>
           <p:cNvPr id="3" name="Picture Placeholder 2"/>
           <p:cNvSpPr>
-            <a:spLocks noGrp="1"/>
+            <a:spLocks noGrp="1" noChangeAspect="1"/>
           </p:cNvSpPr>
           <p:nvPr>
             <p:ph type="pic" idx="1"/>
@@ -2234,52 +2232,56 @@
         </p:nvSpPr>
         <p:spPr>
           <a:xfrm>
-            <a:off x="5183188" y="987425"/>
-            <a:ext cx="6172200" cy="4873625"/>
-          </a:xfrm>
-        </p:spPr>
-        <p:txBody>
-          <a:bodyPr/>
+            <a:off x="4146550" y="1053255"/>
+            <a:ext cx="4937760" cy="5198533"/>
+          </a:xfrm>
+        </p:spPr>
+        <p:txBody>
+          <a:bodyPr anchor="t"/>
           <a:lstStyle>
             <a:lvl1pPr marL="0" indent="0">
               <a:buNone/>
-              <a:defRPr sz="3200"/>
+              <a:defRPr sz="3413"/>
             </a:lvl1pPr>
-            <a:lvl2pPr marL="457200" indent="0">
-              <a:buNone/>
-              <a:defRPr sz="2800"/>
+            <a:lvl2pPr marL="487695" indent="0">
+              <a:buNone/>
+              <a:defRPr sz="2987"/>
             </a:lvl2pPr>
-            <a:lvl3pPr marL="914400" indent="0">
-              <a:buNone/>
-              <a:defRPr sz="2400"/>
+            <a:lvl3pPr marL="975390" indent="0">
+              <a:buNone/>
+              <a:defRPr sz="2560"/>
             </a:lvl3pPr>
-            <a:lvl4pPr marL="1371600" indent="0">
-              <a:buNone/>
-              <a:defRPr sz="2000"/>
+            <a:lvl4pPr marL="1463086" indent="0">
+              <a:buNone/>
+              <a:defRPr sz="2133"/>
             </a:lvl4pPr>
-            <a:lvl5pPr marL="1828800" indent="0">
-              <a:buNone/>
-              <a:defRPr sz="2000"/>
+            <a:lvl5pPr marL="1950781" indent="0">
+              <a:buNone/>
+              <a:defRPr sz="2133"/>
             </a:lvl5pPr>
-            <a:lvl6pPr marL="2286000" indent="0">
-              <a:buNone/>
-              <a:defRPr sz="2000"/>
+            <a:lvl6pPr marL="2438476" indent="0">
+              <a:buNone/>
+              <a:defRPr sz="2133"/>
             </a:lvl6pPr>
-            <a:lvl7pPr marL="2743200" indent="0">
-              <a:buNone/>
-              <a:defRPr sz="2000"/>
+            <a:lvl7pPr marL="2926171" indent="0">
+              <a:buNone/>
+              <a:defRPr sz="2133"/>
             </a:lvl7pPr>
-            <a:lvl8pPr marL="3200400" indent="0">
-              <a:buNone/>
-              <a:defRPr sz="2000"/>
+            <a:lvl8pPr marL="3413867" indent="0">
+              <a:buNone/>
+              <a:defRPr sz="2133"/>
             </a:lvl8pPr>
-            <a:lvl9pPr marL="3657600" indent="0">
-              <a:buNone/>
-              <a:defRPr sz="2000"/>
+            <a:lvl9pPr marL="3901562" indent="0">
+              <a:buNone/>
+              <a:defRPr sz="2133"/>
             </a:lvl9pPr>
           </a:lstStyle>
           <a:p>
-            <a:endParaRPr lang="en-US"/>
+            <a:r>
+              <a:rPr lang="en-US"/>
+              <a:t>Click icon to add picture</a:t>
+            </a:r>
+            <a:endParaRPr lang="en-US" dirty="0"/>
           </a:p>
         </p:txBody>
       </p:sp>
@@ -2295,8 +2297,8 @@
         </p:nvSpPr>
         <p:spPr>
           <a:xfrm>
-            <a:off x="839788" y="2057400"/>
-            <a:ext cx="3932237" cy="3811588"/>
+            <a:off x="671830" y="2194560"/>
+            <a:ext cx="3145790" cy="4065694"/>
           </a:xfrm>
         </p:spPr>
         <p:txBody>
@@ -2304,39 +2306,39 @@
           <a:lstStyle>
             <a:lvl1pPr marL="0" indent="0">
               <a:buNone/>
-              <a:defRPr sz="1600"/>
+              <a:defRPr sz="1707"/>
             </a:lvl1pPr>
-            <a:lvl2pPr marL="457200" indent="0">
-              <a:buNone/>
-              <a:defRPr sz="1400"/>
+            <a:lvl2pPr marL="487695" indent="0">
+              <a:buNone/>
+              <a:defRPr sz="1493"/>
             </a:lvl2pPr>
-            <a:lvl3pPr marL="914400" indent="0">
-              <a:buNone/>
-              <a:defRPr sz="1200"/>
+            <a:lvl3pPr marL="975390" indent="0">
+              <a:buNone/>
+              <a:defRPr sz="1280"/>
             </a:lvl3pPr>
-            <a:lvl4pPr marL="1371600" indent="0">
-              <a:buNone/>
-              <a:defRPr sz="1000"/>
+            <a:lvl4pPr marL="1463086" indent="0">
+              <a:buNone/>
+              <a:defRPr sz="1067"/>
             </a:lvl4pPr>
-            <a:lvl5pPr marL="1828800" indent="0">
-              <a:buNone/>
-              <a:defRPr sz="1000"/>
+            <a:lvl5pPr marL="1950781" indent="0">
+              <a:buNone/>
+              <a:defRPr sz="1067"/>
             </a:lvl5pPr>
-            <a:lvl6pPr marL="2286000" indent="0">
-              <a:buNone/>
-              <a:defRPr sz="1000"/>
+            <a:lvl6pPr marL="2438476" indent="0">
+              <a:buNone/>
+              <a:defRPr sz="1067"/>
             </a:lvl6pPr>
-            <a:lvl7pPr marL="2743200" indent="0">
-              <a:buNone/>
-              <a:defRPr sz="1000"/>
+            <a:lvl7pPr marL="2926171" indent="0">
+              <a:buNone/>
+              <a:defRPr sz="1067"/>
             </a:lvl7pPr>
-            <a:lvl8pPr marL="3200400" indent="0">
-              <a:buNone/>
-              <a:defRPr sz="1000"/>
+            <a:lvl8pPr marL="3413867" indent="0">
+              <a:buNone/>
+              <a:defRPr sz="1067"/>
             </a:lvl8pPr>
-            <a:lvl9pPr marL="3657600" indent="0">
-              <a:buNone/>
-              <a:defRPr sz="1000"/>
+            <a:lvl9pPr marL="3901562" indent="0">
+              <a:buNone/>
+              <a:defRPr sz="1067"/>
             </a:lvl9pPr>
           </a:lstStyle>
           <a:p>
@@ -2416,7 +2418,7 @@
     </p:spTree>
     <p:extLst>
       <p:ext uri="{BB962C8B-B14F-4D97-AF65-F5344CB8AC3E}">
-        <p14:creationId xmlns:p14="http://schemas.microsoft.com/office/powerpoint/2010/main" val="3669932603"/>
+        <p14:creationId xmlns:p14="http://schemas.microsoft.com/office/powerpoint/2010/main" val="3650783673"/>
       </p:ext>
     </p:extLst>
   </p:cSld>
@@ -2460,8 +2462,8 @@
         </p:nvSpPr>
         <p:spPr>
           <a:xfrm>
-            <a:off x="838200" y="365125"/>
-            <a:ext cx="10515600" cy="1325563"/>
+            <a:off x="670560" y="389468"/>
+            <a:ext cx="8412480" cy="1413934"/>
           </a:xfrm>
           <a:prstGeom prst="rect">
             <a:avLst/>
@@ -2477,7 +2479,7 @@
               <a:rPr lang="en-US"/>
               <a:t>Click to edit Master title style</a:t>
             </a:r>
-            <a:endParaRPr lang="en-US"/>
+            <a:endParaRPr lang="en-US" dirty="0"/>
           </a:p>
         </p:txBody>
       </p:sp>
@@ -2493,8 +2495,8 @@
         </p:nvSpPr>
         <p:spPr>
           <a:xfrm>
-            <a:off x="838200" y="1825625"/>
-            <a:ext cx="10515600" cy="4351338"/>
+            <a:off x="670560" y="1947333"/>
+            <a:ext cx="8412480" cy="4641427"/>
           </a:xfrm>
           <a:prstGeom prst="rect">
             <a:avLst/>
@@ -2539,7 +2541,7 @@
               <a:rPr lang="en-US"/>
               <a:t>Fifth level</a:t>
             </a:r>
-            <a:endParaRPr lang="en-US"/>
+            <a:endParaRPr lang="en-US" dirty="0"/>
           </a:p>
         </p:txBody>
       </p:sp>
@@ -2555,8 +2557,8 @@
         </p:nvSpPr>
         <p:spPr>
           <a:xfrm>
-            <a:off x="838200" y="6356350"/>
-            <a:ext cx="2743200" cy="365125"/>
+            <a:off x="670560" y="6780108"/>
+            <a:ext cx="2194560" cy="389467"/>
           </a:xfrm>
           <a:prstGeom prst="rect">
             <a:avLst/>
@@ -2566,7 +2568,7 @@
           <a:bodyPr vert="horz" lIns="91440" tIns="45720" rIns="91440" bIns="45720" rtlCol="0" anchor="ctr"/>
           <a:lstStyle>
             <a:lvl1pPr algn="l">
-              <a:defRPr sz="1200">
+              <a:defRPr sz="1280">
                 <a:solidFill>
                   <a:schemeClr val="tx1">
                     <a:tint val="75000"/>
@@ -2596,8 +2598,8 @@
         </p:nvSpPr>
         <p:spPr>
           <a:xfrm>
-            <a:off x="4038600" y="6356350"/>
-            <a:ext cx="4114800" cy="365125"/>
+            <a:off x="3230880" y="6780108"/>
+            <a:ext cx="3291840" cy="389467"/>
           </a:xfrm>
           <a:prstGeom prst="rect">
             <a:avLst/>
@@ -2607,7 +2609,7 @@
           <a:bodyPr vert="horz" lIns="91440" tIns="45720" rIns="91440" bIns="45720" rtlCol="0" anchor="ctr"/>
           <a:lstStyle>
             <a:lvl1pPr algn="ctr">
-              <a:defRPr sz="1200">
+              <a:defRPr sz="1280">
                 <a:solidFill>
                   <a:schemeClr val="tx1">
                     <a:tint val="75000"/>
@@ -2633,8 +2635,8 @@
         </p:nvSpPr>
         <p:spPr>
           <a:xfrm>
-            <a:off x="8610600" y="6356350"/>
-            <a:ext cx="2743200" cy="365125"/>
+            <a:off x="6888480" y="6780108"/>
+            <a:ext cx="2194560" cy="389467"/>
           </a:xfrm>
           <a:prstGeom prst="rect">
             <a:avLst/>
@@ -2644,7 +2646,7 @@
           <a:bodyPr vert="horz" lIns="91440" tIns="45720" rIns="91440" bIns="45720" rtlCol="0" anchor="ctr"/>
           <a:lstStyle>
             <a:lvl1pPr algn="r">
-              <a:defRPr sz="1200">
+              <a:defRPr sz="1280">
                 <a:solidFill>
                   <a:schemeClr val="tx1">
                     <a:tint val="75000"/>
@@ -2665,27 +2667,27 @@
     </p:spTree>
     <p:extLst>
       <p:ext uri="{BB962C8B-B14F-4D97-AF65-F5344CB8AC3E}">
-        <p14:creationId xmlns:p14="http://schemas.microsoft.com/office/powerpoint/2010/main" val="1007421598"/>
+        <p14:creationId xmlns:p14="http://schemas.microsoft.com/office/powerpoint/2010/main" val="1026233889"/>
       </p:ext>
     </p:extLst>
   </p:cSld>
   <p:clrMap bg1="lt1" tx1="dk1" bg2="lt2" tx2="dk2" accent1="accent1" accent2="accent2" accent3="accent3" accent4="accent4" accent5="accent5" accent6="accent6" hlink="hlink" folHlink="folHlink"/>
   <p:sldLayoutIdLst>
-    <p:sldLayoutId id="2147483649" r:id="rId1"/>
-    <p:sldLayoutId id="2147483650" r:id="rId2"/>
-    <p:sldLayoutId id="2147483651" r:id="rId3"/>
-    <p:sldLayoutId id="2147483652" r:id="rId4"/>
-    <p:sldLayoutId id="2147483653" r:id="rId5"/>
-    <p:sldLayoutId id="2147483654" r:id="rId6"/>
-    <p:sldLayoutId id="2147483655" r:id="rId7"/>
-    <p:sldLayoutId id="2147483656" r:id="rId8"/>
-    <p:sldLayoutId id="2147483657" r:id="rId9"/>
-    <p:sldLayoutId id="2147483658" r:id="rId10"/>
-    <p:sldLayoutId id="2147483659" r:id="rId11"/>
+    <p:sldLayoutId id="2147483661" r:id="rId1"/>
+    <p:sldLayoutId id="2147483662" r:id="rId2"/>
+    <p:sldLayoutId id="2147483663" r:id="rId3"/>
+    <p:sldLayoutId id="2147483664" r:id="rId4"/>
+    <p:sldLayoutId id="2147483665" r:id="rId5"/>
+    <p:sldLayoutId id="2147483666" r:id="rId6"/>
+    <p:sldLayoutId id="2147483667" r:id="rId7"/>
+    <p:sldLayoutId id="2147483668" r:id="rId8"/>
+    <p:sldLayoutId id="2147483669" r:id="rId9"/>
+    <p:sldLayoutId id="2147483670" r:id="rId10"/>
+    <p:sldLayoutId id="2147483671" r:id="rId11"/>
   </p:sldLayoutIdLst>
   <p:txStyles>
     <p:titleStyle>
-      <a:lvl1pPr algn="l" defTabSz="914400" rtl="0" eaLnBrk="1" latinLnBrk="0" hangingPunct="1">
+      <a:lvl1pPr algn="l" defTabSz="975390" rtl="0" eaLnBrk="1" latinLnBrk="0" hangingPunct="1">
         <a:lnSpc>
           <a:spcPct val="90000"/>
         </a:lnSpc>
@@ -2693,7 +2695,7 @@
           <a:spcPct val="0"/>
         </a:spcBef>
         <a:buNone/>
-        <a:defRPr sz="4400" kern="1200">
+        <a:defRPr sz="4693" kern="1200">
           <a:solidFill>
             <a:schemeClr val="tx1"/>
           </a:solidFill>
@@ -2704,16 +2706,16 @@
       </a:lvl1pPr>
     </p:titleStyle>
     <p:bodyStyle>
-      <a:lvl1pPr marL="228600" indent="-228600" algn="l" defTabSz="914400" rtl="0" eaLnBrk="1" latinLnBrk="0" hangingPunct="1">
+      <a:lvl1pPr marL="243848" indent="-243848" algn="l" defTabSz="975390" rtl="0" eaLnBrk="1" latinLnBrk="0" hangingPunct="1">
         <a:lnSpc>
           <a:spcPct val="90000"/>
         </a:lnSpc>
         <a:spcBef>
-          <a:spcPts val="1000"/>
+          <a:spcPts val="1067"/>
         </a:spcBef>
         <a:buFont typeface="Arial" panose="020B0604020202020204" pitchFamily="34" charset="0"/>
         <a:buChar char="•"/>
-        <a:defRPr sz="2800" kern="1200">
+        <a:defRPr sz="2987" kern="1200">
           <a:solidFill>
             <a:schemeClr val="tx1"/>
           </a:solidFill>
@@ -2722,16 +2724,16 @@
           <a:cs typeface="+mn-cs"/>
         </a:defRPr>
       </a:lvl1pPr>
-      <a:lvl2pPr marL="685800" indent="-228600" algn="l" defTabSz="914400" rtl="0" eaLnBrk="1" latinLnBrk="0" hangingPunct="1">
+      <a:lvl2pPr marL="731543" indent="-243848" algn="l" defTabSz="975390" rtl="0" eaLnBrk="1" latinLnBrk="0" hangingPunct="1">
         <a:lnSpc>
           <a:spcPct val="90000"/>
         </a:lnSpc>
         <a:spcBef>
-          <a:spcPts val="500"/>
+          <a:spcPts val="533"/>
         </a:spcBef>
         <a:buFont typeface="Arial" panose="020B0604020202020204" pitchFamily="34" charset="0"/>
         <a:buChar char="•"/>
-        <a:defRPr sz="2400" kern="1200">
+        <a:defRPr sz="2560" kern="1200">
           <a:solidFill>
             <a:schemeClr val="tx1"/>
           </a:solidFill>
@@ -2740,16 +2742,16 @@
           <a:cs typeface="+mn-cs"/>
         </a:defRPr>
       </a:lvl2pPr>
-      <a:lvl3pPr marL="1143000" indent="-228600" algn="l" defTabSz="914400" rtl="0" eaLnBrk="1" latinLnBrk="0" hangingPunct="1">
+      <a:lvl3pPr marL="1219238" indent="-243848" algn="l" defTabSz="975390" rtl="0" eaLnBrk="1" latinLnBrk="0" hangingPunct="1">
         <a:lnSpc>
           <a:spcPct val="90000"/>
         </a:lnSpc>
         <a:spcBef>
-          <a:spcPts val="500"/>
+          <a:spcPts val="533"/>
         </a:spcBef>
         <a:buFont typeface="Arial" panose="020B0604020202020204" pitchFamily="34" charset="0"/>
         <a:buChar char="•"/>
-        <a:defRPr sz="2000" kern="1200">
+        <a:defRPr sz="2133" kern="1200">
           <a:solidFill>
             <a:schemeClr val="tx1"/>
           </a:solidFill>
@@ -2758,16 +2760,16 @@
           <a:cs typeface="+mn-cs"/>
         </a:defRPr>
       </a:lvl3pPr>
-      <a:lvl4pPr marL="1600200" indent="-228600" algn="l" defTabSz="914400" rtl="0" eaLnBrk="1" latinLnBrk="0" hangingPunct="1">
+      <a:lvl4pPr marL="1706933" indent="-243848" algn="l" defTabSz="975390" rtl="0" eaLnBrk="1" latinLnBrk="0" hangingPunct="1">
         <a:lnSpc>
           <a:spcPct val="90000"/>
         </a:lnSpc>
         <a:spcBef>
-          <a:spcPts val="500"/>
+          <a:spcPts val="533"/>
         </a:spcBef>
         <a:buFont typeface="Arial" panose="020B0604020202020204" pitchFamily="34" charset="0"/>
         <a:buChar char="•"/>
-        <a:defRPr sz="1800" kern="1200">
+        <a:defRPr sz="1920" kern="1200">
           <a:solidFill>
             <a:schemeClr val="tx1"/>
           </a:solidFill>
@@ -2776,16 +2778,16 @@
           <a:cs typeface="+mn-cs"/>
         </a:defRPr>
       </a:lvl4pPr>
-      <a:lvl5pPr marL="2057400" indent="-228600" algn="l" defTabSz="914400" rtl="0" eaLnBrk="1" latinLnBrk="0" hangingPunct="1">
+      <a:lvl5pPr marL="2194629" indent="-243848" algn="l" defTabSz="975390" rtl="0" eaLnBrk="1" latinLnBrk="0" hangingPunct="1">
         <a:lnSpc>
           <a:spcPct val="90000"/>
         </a:lnSpc>
         <a:spcBef>
-          <a:spcPts val="500"/>
+          <a:spcPts val="533"/>
         </a:spcBef>
         <a:buFont typeface="Arial" panose="020B0604020202020204" pitchFamily="34" charset="0"/>
         <a:buChar char="•"/>
-        <a:defRPr sz="1800" kern="1200">
+        <a:defRPr sz="1920" kern="1200">
           <a:solidFill>
             <a:schemeClr val="tx1"/>
           </a:solidFill>
@@ -2794,16 +2796,16 @@
           <a:cs typeface="+mn-cs"/>
         </a:defRPr>
       </a:lvl5pPr>
-      <a:lvl6pPr marL="2514600" indent="-228600" algn="l" defTabSz="914400" rtl="0" eaLnBrk="1" latinLnBrk="0" hangingPunct="1">
+      <a:lvl6pPr marL="2682324" indent="-243848" algn="l" defTabSz="975390" rtl="0" eaLnBrk="1" latinLnBrk="0" hangingPunct="1">
         <a:lnSpc>
           <a:spcPct val="90000"/>
         </a:lnSpc>
         <a:spcBef>
-          <a:spcPts val="500"/>
+          <a:spcPts val="533"/>
         </a:spcBef>
         <a:buFont typeface="Arial" panose="020B0604020202020204" pitchFamily="34" charset="0"/>
         <a:buChar char="•"/>
-        <a:defRPr sz="1800" kern="1200">
+        <a:defRPr sz="1920" kern="1200">
           <a:solidFill>
             <a:schemeClr val="tx1"/>
           </a:solidFill>
@@ -2812,16 +2814,16 @@
           <a:cs typeface="+mn-cs"/>
         </a:defRPr>
       </a:lvl6pPr>
-      <a:lvl7pPr marL="2971800" indent="-228600" algn="l" defTabSz="914400" rtl="0" eaLnBrk="1" latinLnBrk="0" hangingPunct="1">
+      <a:lvl7pPr marL="3170019" indent="-243848" algn="l" defTabSz="975390" rtl="0" eaLnBrk="1" latinLnBrk="0" hangingPunct="1">
         <a:lnSpc>
           <a:spcPct val="90000"/>
         </a:lnSpc>
         <a:spcBef>
-          <a:spcPts val="500"/>
+          <a:spcPts val="533"/>
         </a:spcBef>
         <a:buFont typeface="Arial" panose="020B0604020202020204" pitchFamily="34" charset="0"/>
         <a:buChar char="•"/>
-        <a:defRPr sz="1800" kern="1200">
+        <a:defRPr sz="1920" kern="1200">
           <a:solidFill>
             <a:schemeClr val="tx1"/>
           </a:solidFill>
@@ -2830,16 +2832,16 @@
           <a:cs typeface="+mn-cs"/>
         </a:defRPr>
       </a:lvl7pPr>
-      <a:lvl8pPr marL="3429000" indent="-228600" algn="l" defTabSz="914400" rtl="0" eaLnBrk="1" latinLnBrk="0" hangingPunct="1">
+      <a:lvl8pPr marL="3657714" indent="-243848" algn="l" defTabSz="975390" rtl="0" eaLnBrk="1" latinLnBrk="0" hangingPunct="1">
         <a:lnSpc>
           <a:spcPct val="90000"/>
         </a:lnSpc>
         <a:spcBef>
-          <a:spcPts val="500"/>
+          <a:spcPts val="533"/>
         </a:spcBef>
         <a:buFont typeface="Arial" panose="020B0604020202020204" pitchFamily="34" charset="0"/>
         <a:buChar char="•"/>
-        <a:defRPr sz="1800" kern="1200">
+        <a:defRPr sz="1920" kern="1200">
           <a:solidFill>
             <a:schemeClr val="tx1"/>
           </a:solidFill>
@@ -2848,16 +2850,16 @@
           <a:cs typeface="+mn-cs"/>
         </a:defRPr>
       </a:lvl8pPr>
-      <a:lvl9pPr marL="3886200" indent="-228600" algn="l" defTabSz="914400" rtl="0" eaLnBrk="1" latinLnBrk="0" hangingPunct="1">
+      <a:lvl9pPr marL="4145410" indent="-243848" algn="l" defTabSz="975390" rtl="0" eaLnBrk="1" latinLnBrk="0" hangingPunct="1">
         <a:lnSpc>
           <a:spcPct val="90000"/>
         </a:lnSpc>
         <a:spcBef>
-          <a:spcPts val="500"/>
+          <a:spcPts val="533"/>
         </a:spcBef>
         <a:buFont typeface="Arial" panose="020B0604020202020204" pitchFamily="34" charset="0"/>
         <a:buChar char="•"/>
-        <a:defRPr sz="1800" kern="1200">
+        <a:defRPr sz="1920" kern="1200">
           <a:solidFill>
             <a:schemeClr val="tx1"/>
           </a:solidFill>
@@ -2871,8 +2873,8 @@
       <a:defPPr>
         <a:defRPr lang="en-US"/>
       </a:defPPr>
-      <a:lvl1pPr marL="0" algn="l" defTabSz="914400" rtl="0" eaLnBrk="1" latinLnBrk="0" hangingPunct="1">
-        <a:defRPr sz="1800" kern="1200">
+      <a:lvl1pPr marL="0" algn="l" defTabSz="975390" rtl="0" eaLnBrk="1" latinLnBrk="0" hangingPunct="1">
+        <a:defRPr sz="1920" kern="1200">
           <a:solidFill>
             <a:schemeClr val="tx1"/>
           </a:solidFill>
@@ -2881,8 +2883,8 @@
           <a:cs typeface="+mn-cs"/>
         </a:defRPr>
       </a:lvl1pPr>
-      <a:lvl2pPr marL="457200" algn="l" defTabSz="914400" rtl="0" eaLnBrk="1" latinLnBrk="0" hangingPunct="1">
-        <a:defRPr sz="1800" kern="1200">
+      <a:lvl2pPr marL="487695" algn="l" defTabSz="975390" rtl="0" eaLnBrk="1" latinLnBrk="0" hangingPunct="1">
+        <a:defRPr sz="1920" kern="1200">
           <a:solidFill>
             <a:schemeClr val="tx1"/>
           </a:solidFill>
@@ -2891,8 +2893,8 @@
           <a:cs typeface="+mn-cs"/>
         </a:defRPr>
       </a:lvl2pPr>
-      <a:lvl3pPr marL="914400" algn="l" defTabSz="914400" rtl="0" eaLnBrk="1" latinLnBrk="0" hangingPunct="1">
-        <a:defRPr sz="1800" kern="1200">
+      <a:lvl3pPr marL="975390" algn="l" defTabSz="975390" rtl="0" eaLnBrk="1" latinLnBrk="0" hangingPunct="1">
+        <a:defRPr sz="1920" kern="1200">
           <a:solidFill>
             <a:schemeClr val="tx1"/>
           </a:solidFill>
@@ -2901,8 +2903,8 @@
           <a:cs typeface="+mn-cs"/>
         </a:defRPr>
       </a:lvl3pPr>
-      <a:lvl4pPr marL="1371600" algn="l" defTabSz="914400" rtl="0" eaLnBrk="1" latinLnBrk="0" hangingPunct="1">
-        <a:defRPr sz="1800" kern="1200">
+      <a:lvl4pPr marL="1463086" algn="l" defTabSz="975390" rtl="0" eaLnBrk="1" latinLnBrk="0" hangingPunct="1">
+        <a:defRPr sz="1920" kern="1200">
           <a:solidFill>
             <a:schemeClr val="tx1"/>
           </a:solidFill>
@@ -2911,8 +2913,8 @@
           <a:cs typeface="+mn-cs"/>
         </a:defRPr>
       </a:lvl4pPr>
-      <a:lvl5pPr marL="1828800" algn="l" defTabSz="914400" rtl="0" eaLnBrk="1" latinLnBrk="0" hangingPunct="1">
-        <a:defRPr sz="1800" kern="1200">
+      <a:lvl5pPr marL="1950781" algn="l" defTabSz="975390" rtl="0" eaLnBrk="1" latinLnBrk="0" hangingPunct="1">
+        <a:defRPr sz="1920" kern="1200">
           <a:solidFill>
             <a:schemeClr val="tx1"/>
           </a:solidFill>
@@ -2921,8 +2923,8 @@
           <a:cs typeface="+mn-cs"/>
         </a:defRPr>
       </a:lvl5pPr>
-      <a:lvl6pPr marL="2286000" algn="l" defTabSz="914400" rtl="0" eaLnBrk="1" latinLnBrk="0" hangingPunct="1">
-        <a:defRPr sz="1800" kern="1200">
+      <a:lvl6pPr marL="2438476" algn="l" defTabSz="975390" rtl="0" eaLnBrk="1" latinLnBrk="0" hangingPunct="1">
+        <a:defRPr sz="1920" kern="1200">
           <a:solidFill>
             <a:schemeClr val="tx1"/>
           </a:solidFill>
@@ -2931,8 +2933,8 @@
           <a:cs typeface="+mn-cs"/>
         </a:defRPr>
       </a:lvl6pPr>
-      <a:lvl7pPr marL="2743200" algn="l" defTabSz="914400" rtl="0" eaLnBrk="1" latinLnBrk="0" hangingPunct="1">
-        <a:defRPr sz="1800" kern="1200">
+      <a:lvl7pPr marL="2926171" algn="l" defTabSz="975390" rtl="0" eaLnBrk="1" latinLnBrk="0" hangingPunct="1">
+        <a:defRPr sz="1920" kern="1200">
           <a:solidFill>
             <a:schemeClr val="tx1"/>
           </a:solidFill>
@@ -2941,8 +2943,8 @@
           <a:cs typeface="+mn-cs"/>
         </a:defRPr>
       </a:lvl7pPr>
-      <a:lvl8pPr marL="3200400" algn="l" defTabSz="914400" rtl="0" eaLnBrk="1" latinLnBrk="0" hangingPunct="1">
-        <a:defRPr sz="1800" kern="1200">
+      <a:lvl8pPr marL="3413867" algn="l" defTabSz="975390" rtl="0" eaLnBrk="1" latinLnBrk="0" hangingPunct="1">
+        <a:defRPr sz="1920" kern="1200">
           <a:solidFill>
             <a:schemeClr val="tx1"/>
           </a:solidFill>
@@ -2951,8 +2953,8 @@
           <a:cs typeface="+mn-cs"/>
         </a:defRPr>
       </a:lvl8pPr>
-      <a:lvl9pPr marL="3657600" algn="l" defTabSz="914400" rtl="0" eaLnBrk="1" latinLnBrk="0" hangingPunct="1">
-        <a:defRPr sz="1800" kern="1200">
+      <a:lvl9pPr marL="3901562" algn="l" defTabSz="975390" rtl="0" eaLnBrk="1" latinLnBrk="0" hangingPunct="1">
+        <a:defRPr sz="1920" kern="1200">
           <a:solidFill>
             <a:schemeClr val="tx1"/>
           </a:solidFill>
@@ -3005,8 +3007,8 @@
         </p:blipFill>
         <p:spPr>
           <a:xfrm>
-            <a:off x="1552756" y="626241"/>
-            <a:ext cx="7661910" cy="5688296"/>
+            <a:off x="790448" y="707137"/>
+            <a:ext cx="8172704" cy="6067516"/>
           </a:xfrm>
           <a:prstGeom prst="rect">
             <a:avLst/>
@@ -3016,13 +3018,15 @@
       <p:sp>
         <p:nvSpPr>
           <p:cNvPr id="5" name="Rectangle 4"/>
-          <p:cNvSpPr/>
+          <p:cNvSpPr>
+            <a:spLocks noChangeAspect="1"/>
+          </p:cNvSpPr>
           <p:nvPr/>
         </p:nvSpPr>
         <p:spPr>
           <a:xfrm>
-            <a:off x="6596692" y="1552756"/>
-            <a:ext cx="142875" cy="152400"/>
+            <a:off x="6444322" y="1713600"/>
+            <a:ext cx="136550" cy="136550"/>
           </a:xfrm>
           <a:prstGeom prst="rect">
             <a:avLst/>
@@ -3052,20 +3056,22 @@
           <a:lstStyle/>
           <a:p>
             <a:pPr algn="ctr"/>
-            <a:endParaRPr lang="en-US"/>
+            <a:endParaRPr lang="en-US" sz="1920"/>
           </a:p>
         </p:txBody>
       </p:sp>
       <p:sp>
         <p:nvSpPr>
           <p:cNvPr id="6" name="Oval 5"/>
-          <p:cNvSpPr/>
+          <p:cNvSpPr>
+            <a:spLocks noChangeAspect="1"/>
+          </p:cNvSpPr>
           <p:nvPr/>
         </p:nvSpPr>
         <p:spPr>
           <a:xfrm>
-            <a:off x="6596692" y="1854679"/>
-            <a:ext cx="131912" cy="155276"/>
+            <a:off x="6415061" y="1841790"/>
+            <a:ext cx="165811" cy="165628"/>
           </a:xfrm>
           <a:prstGeom prst="ellipse">
             <a:avLst/>
@@ -3092,20 +3098,22 @@
           <a:lstStyle/>
           <a:p>
             <a:pPr algn="ctr"/>
-            <a:endParaRPr lang="en-US"/>
+            <a:endParaRPr lang="en-US" sz="1920"/>
           </a:p>
         </p:txBody>
       </p:sp>
       <p:sp>
         <p:nvSpPr>
           <p:cNvPr id="7" name="5-Point Star 6"/>
-          <p:cNvSpPr/>
+          <p:cNvSpPr>
+            <a:spLocks noChangeAspect="1"/>
+          </p:cNvSpPr>
           <p:nvPr/>
         </p:nvSpPr>
         <p:spPr>
           <a:xfrm>
-            <a:off x="6662648" y="1720971"/>
-            <a:ext cx="142875" cy="117893"/>
+            <a:off x="6457734" y="1784679"/>
+            <a:ext cx="152400" cy="156058"/>
           </a:xfrm>
           <a:prstGeom prst="star5">
             <a:avLst/>
@@ -3132,20 +3140,22 @@
           <a:lstStyle/>
           <a:p>
             <a:pPr algn="ctr"/>
-            <a:endParaRPr lang="en-US"/>
+            <a:endParaRPr lang="en-US" sz="1920"/>
           </a:p>
         </p:txBody>
       </p:sp>
       <p:sp>
         <p:nvSpPr>
           <p:cNvPr id="8" name="Isosceles Triangle 7"/>
-          <p:cNvSpPr/>
+          <p:cNvSpPr>
+            <a:spLocks noChangeAspect="1"/>
+          </p:cNvSpPr>
           <p:nvPr/>
         </p:nvSpPr>
         <p:spPr>
           <a:xfrm>
-            <a:off x="6805523" y="1337094"/>
-            <a:ext cx="104235" cy="112144"/>
+            <a:off x="6657159" y="1340657"/>
+            <a:ext cx="117043" cy="119620"/>
           </a:xfrm>
           <a:prstGeom prst="triangle">
             <a:avLst/>
@@ -3172,7 +3182,7 @@
           <a:lstStyle/>
           <a:p>
             <a:pPr algn="ctr"/>
-            <a:endParaRPr lang="en-US"/>
+            <a:endParaRPr lang="en-US" sz="1920"/>
           </a:p>
         </p:txBody>
       </p:sp>
@@ -3184,8 +3194,8 @@
         </p:nvSpPr>
         <p:spPr>
           <a:xfrm>
-            <a:off x="3217652" y="3708101"/>
-            <a:ext cx="1940944" cy="1477328"/>
+            <a:off x="2581575" y="3955308"/>
+            <a:ext cx="2070340" cy="1569660"/>
           </a:xfrm>
           <a:prstGeom prst="rect">
             <a:avLst/>
@@ -3199,7 +3209,7 @@
           <a:lstStyle/>
           <a:p>
             <a:r>
-              <a:rPr lang="en-US" dirty="0">
+              <a:rPr lang="en-US" sz="1920" dirty="0">
                 <a:latin typeface="Arial" panose="020B0604020202020204" pitchFamily="34" charset="0"/>
                 <a:cs typeface="Arial" panose="020B0604020202020204" pitchFamily="34" charset="0"/>
               </a:rPr>
@@ -3208,28 +3218,28 @@
           </a:p>
           <a:p>
             <a:r>
-              <a:rPr lang="en-US" dirty="0">
+              <a:rPr lang="en-US" sz="1920" dirty="0">
                 <a:latin typeface="Arial" panose="020B0604020202020204" pitchFamily="34" charset="0"/>
                 <a:cs typeface="Arial" panose="020B0604020202020204" pitchFamily="34" charset="0"/>
               </a:rPr>
               <a:t>      </a:t>
             </a:r>
             <a:r>
-              <a:rPr lang="en-US" dirty="0" err="1">
+              <a:rPr lang="en-US" sz="1920" dirty="0" err="1">
                 <a:latin typeface="Arial" panose="020B0604020202020204" pitchFamily="34" charset="0"/>
                 <a:cs typeface="Arial" panose="020B0604020202020204" pitchFamily="34" charset="0"/>
               </a:rPr>
               <a:t>T</a:t>
             </a:r>
             <a:r>
-              <a:rPr lang="en-US" baseline="-25000" dirty="0" err="1">
+              <a:rPr lang="en-US" sz="1920" baseline="-25000" dirty="0" err="1">
                 <a:latin typeface="Arial" panose="020B0604020202020204" pitchFamily="34" charset="0"/>
                 <a:cs typeface="Arial" panose="020B0604020202020204" pitchFamily="34" charset="0"/>
               </a:rPr>
               <a:t>bb</a:t>
             </a:r>
             <a:r>
-              <a:rPr lang="en-US" dirty="0">
+              <a:rPr lang="en-US" sz="1920" dirty="0">
                 <a:latin typeface="Arial" panose="020B0604020202020204" pitchFamily="34" charset="0"/>
                 <a:cs typeface="Arial" panose="020B0604020202020204" pitchFamily="34" charset="0"/>
               </a:rPr>
@@ -3238,28 +3248,28 @@
           </a:p>
           <a:p>
             <a:r>
-              <a:rPr lang="en-US" dirty="0">
+              <a:rPr lang="en-US" sz="1920" dirty="0">
                 <a:latin typeface="Arial" panose="020B0604020202020204" pitchFamily="34" charset="0"/>
                 <a:cs typeface="Arial" panose="020B0604020202020204" pitchFamily="34" charset="0"/>
               </a:rPr>
               <a:t>      </a:t>
             </a:r>
             <a:r>
-              <a:rPr lang="en-US" dirty="0" err="1">
+              <a:rPr lang="en-US" sz="1920" dirty="0" err="1">
                 <a:latin typeface="Arial" panose="020B0604020202020204" pitchFamily="34" charset="0"/>
                 <a:cs typeface="Arial" panose="020B0604020202020204" pitchFamily="34" charset="0"/>
               </a:rPr>
               <a:t>T</a:t>
             </a:r>
             <a:r>
-              <a:rPr lang="en-US" baseline="-25000" dirty="0" err="1">
+              <a:rPr lang="en-US" sz="1920" baseline="-25000" dirty="0" err="1">
                 <a:latin typeface="Arial" panose="020B0604020202020204" pitchFamily="34" charset="0"/>
                 <a:cs typeface="Arial" panose="020B0604020202020204" pitchFamily="34" charset="0"/>
               </a:rPr>
               <a:t>bb</a:t>
             </a:r>
             <a:r>
-              <a:rPr lang="en-US" dirty="0">
+              <a:rPr lang="en-US" sz="1920" dirty="0">
                 <a:latin typeface="Arial" panose="020B0604020202020204" pitchFamily="34" charset="0"/>
                 <a:cs typeface="Arial" panose="020B0604020202020204" pitchFamily="34" charset="0"/>
               </a:rPr>
@@ -3268,28 +3278,28 @@
           </a:p>
           <a:p>
             <a:r>
-              <a:rPr lang="en-US" dirty="0">
+              <a:rPr lang="en-US" sz="1920" dirty="0">
                 <a:latin typeface="Arial" panose="020B0604020202020204" pitchFamily="34" charset="0"/>
                 <a:cs typeface="Arial" panose="020B0604020202020204" pitchFamily="34" charset="0"/>
               </a:rPr>
               <a:t>      </a:t>
             </a:r>
             <a:r>
-              <a:rPr lang="en-US" dirty="0" err="1">
+              <a:rPr lang="en-US" sz="1920" dirty="0" err="1">
                 <a:latin typeface="Arial" panose="020B0604020202020204" pitchFamily="34" charset="0"/>
                 <a:cs typeface="Arial" panose="020B0604020202020204" pitchFamily="34" charset="0"/>
               </a:rPr>
               <a:t>T</a:t>
             </a:r>
             <a:r>
-              <a:rPr lang="en-US" baseline="-25000" dirty="0" err="1">
+              <a:rPr lang="en-US" sz="1920" baseline="-25000" dirty="0" err="1">
                 <a:latin typeface="Arial" panose="020B0604020202020204" pitchFamily="34" charset="0"/>
                 <a:cs typeface="Arial" panose="020B0604020202020204" pitchFamily="34" charset="0"/>
               </a:rPr>
               <a:t>bb</a:t>
             </a:r>
             <a:r>
-              <a:rPr lang="en-US" dirty="0">
+              <a:rPr lang="en-US" sz="1920" dirty="0">
                 <a:latin typeface="Arial" panose="020B0604020202020204" pitchFamily="34" charset="0"/>
                 <a:cs typeface="Arial" panose="020B0604020202020204" pitchFamily="34" charset="0"/>
               </a:rPr>
@@ -3298,28 +3308,28 @@
           </a:p>
           <a:p>
             <a:r>
-              <a:rPr lang="en-US" dirty="0">
+              <a:rPr lang="en-US" sz="1920" dirty="0">
                 <a:latin typeface="Arial" panose="020B0604020202020204" pitchFamily="34" charset="0"/>
                 <a:cs typeface="Arial" panose="020B0604020202020204" pitchFamily="34" charset="0"/>
               </a:rPr>
               <a:t>      </a:t>
             </a:r>
             <a:r>
-              <a:rPr lang="en-US" dirty="0" err="1">
+              <a:rPr lang="en-US" sz="1920" dirty="0" err="1">
                 <a:latin typeface="Arial" panose="020B0604020202020204" pitchFamily="34" charset="0"/>
                 <a:cs typeface="Arial" panose="020B0604020202020204" pitchFamily="34" charset="0"/>
               </a:rPr>
               <a:t>T</a:t>
             </a:r>
             <a:r>
-              <a:rPr lang="en-US" baseline="-25000" dirty="0" err="1">
+              <a:rPr lang="en-US" sz="1920" baseline="-25000" dirty="0" err="1">
                 <a:latin typeface="Arial" panose="020B0604020202020204" pitchFamily="34" charset="0"/>
                 <a:cs typeface="Arial" panose="020B0604020202020204" pitchFamily="34" charset="0"/>
               </a:rPr>
               <a:t>bb</a:t>
             </a:r>
             <a:r>
-              <a:rPr lang="en-US" dirty="0">
+              <a:rPr lang="en-US" sz="1920" dirty="0">
                 <a:latin typeface="Arial" panose="020B0604020202020204" pitchFamily="34" charset="0"/>
                 <a:cs typeface="Arial" panose="020B0604020202020204" pitchFamily="34" charset="0"/>
               </a:rPr>
@@ -3331,13 +3341,15 @@
       <p:sp>
         <p:nvSpPr>
           <p:cNvPr id="10" name="Rectangle 9"/>
-          <p:cNvSpPr/>
+          <p:cNvSpPr>
+            <a:spLocks noChangeAspect="1"/>
+          </p:cNvSpPr>
           <p:nvPr/>
         </p:nvSpPr>
         <p:spPr>
           <a:xfrm>
-            <a:off x="3316851" y="4015571"/>
-            <a:ext cx="276045" cy="224287"/>
+            <a:off x="2686077" y="4449071"/>
+            <a:ext cx="165811" cy="169329"/>
           </a:xfrm>
           <a:prstGeom prst="rect">
             <a:avLst/>
@@ -3364,20 +3376,22 @@
           <a:lstStyle/>
           <a:p>
             <a:pPr algn="ctr"/>
-            <a:endParaRPr lang="en-US"/>
+            <a:endParaRPr lang="en-US" sz="1920"/>
           </a:p>
         </p:txBody>
       </p:sp>
       <p:sp>
         <p:nvSpPr>
           <p:cNvPr id="11" name="Oval 10"/>
-          <p:cNvSpPr/>
+          <p:cNvSpPr>
+            <a:spLocks noChangeAspect="1"/>
+          </p:cNvSpPr>
           <p:nvPr/>
         </p:nvSpPr>
         <p:spPr>
           <a:xfrm>
-            <a:off x="3316851" y="4404088"/>
-            <a:ext cx="276045" cy="155270"/>
+            <a:off x="2687388" y="4721600"/>
+            <a:ext cx="165811" cy="165621"/>
           </a:xfrm>
           <a:prstGeom prst="ellipse">
             <a:avLst/>
@@ -3404,7 +3418,7 @@
           <a:lstStyle/>
           <a:p>
             <a:pPr algn="ctr"/>
-            <a:endParaRPr lang="en-US"/>
+            <a:endParaRPr lang="en-US" sz="1920"/>
           </a:p>
         </p:txBody>
       </p:sp>
@@ -3416,8 +3430,8 @@
         </p:nvSpPr>
         <p:spPr>
           <a:xfrm>
-            <a:off x="3390177" y="4641637"/>
-            <a:ext cx="138023" cy="163902"/>
+            <a:off x="2686077" y="4990421"/>
+            <a:ext cx="165811" cy="165811"/>
           </a:xfrm>
           <a:prstGeom prst="star5">
             <a:avLst/>
@@ -3444,20 +3458,22 @@
           <a:lstStyle/>
           <a:p>
             <a:pPr algn="ctr"/>
-            <a:endParaRPr lang="en-US"/>
+            <a:endParaRPr lang="en-US" sz="1920"/>
           </a:p>
         </p:txBody>
       </p:sp>
       <p:sp>
         <p:nvSpPr>
           <p:cNvPr id="13" name="Isosceles Triangle 12"/>
-          <p:cNvSpPr/>
+          <p:cNvSpPr>
+            <a:spLocks noChangeAspect="1"/>
+          </p:cNvSpPr>
           <p:nvPr/>
         </p:nvSpPr>
         <p:spPr>
           <a:xfrm>
-            <a:off x="3398801" y="4887818"/>
-            <a:ext cx="146651" cy="155275"/>
+            <a:off x="2698197" y="5259433"/>
+            <a:ext cx="165811" cy="165627"/>
           </a:xfrm>
           <a:prstGeom prst="triangle">
             <a:avLst/>
@@ -3484,7 +3500,7 @@
           <a:lstStyle/>
           <a:p>
             <a:pPr algn="ctr"/>
-            <a:endParaRPr lang="en-US"/>
+            <a:endParaRPr lang="en-US" sz="1920"/>
           </a:p>
         </p:txBody>
       </p:sp>
@@ -3540,14 +3556,61 @@
         </p:blipFill>
         <p:spPr>
           <a:xfrm>
-            <a:off x="2577830" y="843226"/>
-            <a:ext cx="6485398" cy="4766618"/>
+            <a:off x="1124085" y="899441"/>
+            <a:ext cx="6917758" cy="5084393"/>
           </a:xfrm>
           <a:prstGeom prst="rect">
             <a:avLst/>
           </a:prstGeom>
         </p:spPr>
       </p:pic>
+      <p:sp>
+        <p:nvSpPr>
+          <p:cNvPr id="3" name="Rectangle 2"/>
+          <p:cNvSpPr>
+            <a:spLocks noChangeAspect="1"/>
+          </p:cNvSpPr>
+          <p:nvPr/>
+        </p:nvSpPr>
+        <p:spPr>
+          <a:xfrm>
+            <a:off x="2849881" y="1767841"/>
+            <a:ext cx="132080" cy="132080"/>
+          </a:xfrm>
+          <a:prstGeom prst="rect">
+            <a:avLst/>
+          </a:prstGeom>
+        </p:spPr>
+        <p:style>
+          <a:lnRef idx="2">
+            <a:schemeClr val="accent1">
+              <a:shade val="50000"/>
+            </a:schemeClr>
+          </a:lnRef>
+          <a:fillRef idx="1">
+            <a:schemeClr val="accent1"/>
+          </a:fillRef>
+          <a:effectRef idx="0">
+            <a:schemeClr val="accent1"/>
+          </a:effectRef>
+          <a:fontRef idx="minor">
+            <a:schemeClr val="lt1"/>
+          </a:fontRef>
+        </p:style>
+        <p:txBody>
+          <a:bodyPr rot="0" spcFirstLastPara="0" vertOverflow="overflow" horzOverflow="overflow" vert="horz" wrap="square" lIns="97536" tIns="48768" rIns="97536" bIns="48768" numCol="1" spcCol="0" rtlCol="0" fromWordArt="0" anchor="ctr" anchorCtr="0" forceAA="0" compatLnSpc="1">
+            <a:prstTxWarp prst="textNoShape">
+              <a:avLst/>
+            </a:prstTxWarp>
+            <a:noAutofit/>
+          </a:bodyPr>
+          <a:lstStyle/>
+          <a:p>
+            <a:pPr algn="ctr"/>
+            <a:endParaRPr lang="en-US" sz="1920"/>
+          </a:p>
+        </p:txBody>
+      </p:sp>
     </p:spTree>
     <p:extLst>
       <p:ext uri="{BB962C8B-B14F-4D97-AF65-F5344CB8AC3E}">
@@ -3600,8 +3663,8 @@
         </p:blipFill>
         <p:spPr>
           <a:xfrm>
-            <a:off x="1544129" y="690210"/>
-            <a:ext cx="7498008" cy="5566615"/>
+            <a:off x="564396" y="801194"/>
+            <a:ext cx="7997875" cy="5937723"/>
           </a:xfrm>
           <a:prstGeom prst="rect">
             <a:avLst/>
@@ -3611,13 +3674,15 @@
       <p:sp>
         <p:nvSpPr>
           <p:cNvPr id="3" name="Rectangle 2"/>
-          <p:cNvSpPr/>
+          <p:cNvSpPr>
+            <a:spLocks noChangeAspect="1"/>
+          </p:cNvSpPr>
           <p:nvPr/>
         </p:nvSpPr>
         <p:spPr>
           <a:xfrm>
-            <a:off x="6045578" y="1538394"/>
-            <a:ext cx="118095" cy="133787"/>
+            <a:off x="5722597" y="1753912"/>
+            <a:ext cx="165811" cy="165811"/>
           </a:xfrm>
           <a:prstGeom prst="rect">
             <a:avLst/>
@@ -3644,20 +3709,22 @@
           <a:lstStyle/>
           <a:p>
             <a:pPr algn="ctr"/>
-            <a:endParaRPr lang="en-US" dirty="0"/>
+            <a:endParaRPr lang="en-US" sz="1920" dirty="0"/>
           </a:p>
         </p:txBody>
       </p:sp>
       <p:sp>
         <p:nvSpPr>
           <p:cNvPr id="4" name="Oval 3"/>
-          <p:cNvSpPr/>
+          <p:cNvSpPr>
+            <a:spLocks noChangeAspect="1"/>
+          </p:cNvSpPr>
           <p:nvPr/>
         </p:nvSpPr>
         <p:spPr>
           <a:xfrm>
-            <a:off x="5846645" y="1868572"/>
-            <a:ext cx="98414" cy="105118"/>
+            <a:off x="5722597" y="1915911"/>
+            <a:ext cx="165811" cy="165811"/>
           </a:xfrm>
           <a:prstGeom prst="ellipse">
             <a:avLst/>
@@ -3684,20 +3751,22 @@
           <a:lstStyle/>
           <a:p>
             <a:pPr algn="ctr"/>
-            <a:endParaRPr lang="en-US"/>
+            <a:endParaRPr lang="en-US" sz="1920"/>
           </a:p>
         </p:txBody>
       </p:sp>
       <p:sp>
         <p:nvSpPr>
           <p:cNvPr id="5" name="5-Point Star 4"/>
-          <p:cNvSpPr/>
+          <p:cNvSpPr>
+            <a:spLocks noChangeAspect="1"/>
+          </p:cNvSpPr>
           <p:nvPr/>
         </p:nvSpPr>
         <p:spPr>
           <a:xfrm>
-            <a:off x="5981609" y="1807672"/>
-            <a:ext cx="127937" cy="191124"/>
+            <a:off x="5806287" y="1745919"/>
+            <a:ext cx="165811" cy="165811"/>
           </a:xfrm>
           <a:prstGeom prst="star5">
             <a:avLst/>
@@ -3724,20 +3793,22 @@
           <a:lstStyle/>
           <a:p>
             <a:pPr algn="ctr"/>
-            <a:endParaRPr lang="en-US" dirty="0"/>
+            <a:endParaRPr lang="en-US" sz="1920" dirty="0"/>
           </a:p>
         </p:txBody>
       </p:sp>
       <p:sp>
         <p:nvSpPr>
           <p:cNvPr id="6" name="Isosceles Triangle 5"/>
-          <p:cNvSpPr/>
+          <p:cNvSpPr>
+            <a:spLocks noChangeAspect="1"/>
+          </p:cNvSpPr>
           <p:nvPr/>
         </p:nvSpPr>
         <p:spPr>
           <a:xfrm>
-            <a:off x="5725270" y="1305481"/>
-            <a:ext cx="121375" cy="114675"/>
+            <a:off x="5547098" y="1424195"/>
+            <a:ext cx="175499" cy="165811"/>
           </a:xfrm>
           <a:prstGeom prst="triangle">
             <a:avLst/>
@@ -3764,20 +3835,174 @@
           <a:lstStyle/>
           <a:p>
             <a:pPr algn="ctr"/>
-            <a:endParaRPr lang="en-US"/>
-          </a:p>
-        </p:txBody>
-      </p:sp>
-      <p:sp>
-        <p:nvSpPr>
-          <p:cNvPr id="9" name="Rectangle 8"/>
-          <p:cNvSpPr/>
+            <a:endParaRPr lang="en-US" sz="1920" dirty="0"/>
+          </a:p>
+        </p:txBody>
+      </p:sp>
+      <p:sp>
+        <p:nvSpPr>
+          <p:cNvPr id="14" name="TextBox 13"/>
+          <p:cNvSpPr txBox="1"/>
           <p:nvPr/>
         </p:nvSpPr>
         <p:spPr>
           <a:xfrm>
-            <a:off x="4222571" y="4327221"/>
-            <a:ext cx="314921" cy="248462"/>
+            <a:off x="3349385" y="4316115"/>
+            <a:ext cx="2070340" cy="1569660"/>
+          </a:xfrm>
+          <a:prstGeom prst="rect">
+            <a:avLst/>
+          </a:prstGeom>
+          <a:noFill/>
+        </p:spPr>
+        <p:txBody>
+          <a:bodyPr wrap="square" rtlCol="0">
+            <a:spAutoFit/>
+          </a:bodyPr>
+          <a:lstStyle/>
+          <a:p>
+            <a:r>
+              <a:rPr lang="en-US" sz="1920" dirty="0">
+                <a:latin typeface="Arial" panose="020B0604020202020204" pitchFamily="34" charset="0"/>
+                <a:cs typeface="Arial" panose="020B0604020202020204" pitchFamily="34" charset="0"/>
+              </a:rPr>
+              <a:t>Legend:</a:t>
+            </a:r>
+          </a:p>
+          <a:p>
+            <a:r>
+              <a:rPr lang="en-US" sz="1920" dirty="0">
+                <a:latin typeface="Arial" panose="020B0604020202020204" pitchFamily="34" charset="0"/>
+                <a:cs typeface="Arial" panose="020B0604020202020204" pitchFamily="34" charset="0"/>
+              </a:rPr>
+              <a:t>      </a:t>
+            </a:r>
+            <a:r>
+              <a:rPr lang="en-US" sz="1920" dirty="0" err="1">
+                <a:latin typeface="Arial" panose="020B0604020202020204" pitchFamily="34" charset="0"/>
+                <a:cs typeface="Arial" panose="020B0604020202020204" pitchFamily="34" charset="0"/>
+              </a:rPr>
+              <a:t>T</a:t>
+            </a:r>
+            <a:r>
+              <a:rPr lang="en-US" sz="1920" baseline="-25000" dirty="0" err="1">
+                <a:latin typeface="Arial" panose="020B0604020202020204" pitchFamily="34" charset="0"/>
+                <a:cs typeface="Arial" panose="020B0604020202020204" pitchFamily="34" charset="0"/>
+              </a:rPr>
+              <a:t>bb</a:t>
+            </a:r>
+            <a:r>
+              <a:rPr lang="en-US" sz="1920" dirty="0">
+                <a:latin typeface="Arial" panose="020B0604020202020204" pitchFamily="34" charset="0"/>
+                <a:cs typeface="Arial" panose="020B0604020202020204" pitchFamily="34" charset="0"/>
+              </a:rPr>
+              <a:t>=1e4 K</a:t>
+            </a:r>
+          </a:p>
+          <a:p>
+            <a:r>
+              <a:rPr lang="en-US" sz="1920" dirty="0">
+                <a:latin typeface="Arial" panose="020B0604020202020204" pitchFamily="34" charset="0"/>
+                <a:cs typeface="Arial" panose="020B0604020202020204" pitchFamily="34" charset="0"/>
+              </a:rPr>
+              <a:t>      </a:t>
+            </a:r>
+            <a:r>
+              <a:rPr lang="en-US" sz="1920" dirty="0" err="1">
+                <a:latin typeface="Arial" panose="020B0604020202020204" pitchFamily="34" charset="0"/>
+                <a:cs typeface="Arial" panose="020B0604020202020204" pitchFamily="34" charset="0"/>
+              </a:rPr>
+              <a:t>T</a:t>
+            </a:r>
+            <a:r>
+              <a:rPr lang="en-US" sz="1920" baseline="-25000" dirty="0" err="1">
+                <a:latin typeface="Arial" panose="020B0604020202020204" pitchFamily="34" charset="0"/>
+                <a:cs typeface="Arial" panose="020B0604020202020204" pitchFamily="34" charset="0"/>
+              </a:rPr>
+              <a:t>bb</a:t>
+            </a:r>
+            <a:r>
+              <a:rPr lang="en-US" sz="1920" dirty="0">
+                <a:latin typeface="Arial" panose="020B0604020202020204" pitchFamily="34" charset="0"/>
+                <a:cs typeface="Arial" panose="020B0604020202020204" pitchFamily="34" charset="0"/>
+              </a:rPr>
+              <a:t>=1e5 K</a:t>
+            </a:r>
+          </a:p>
+          <a:p>
+            <a:r>
+              <a:rPr lang="en-US" sz="1920" dirty="0">
+                <a:latin typeface="Arial" panose="020B0604020202020204" pitchFamily="34" charset="0"/>
+                <a:cs typeface="Arial" panose="020B0604020202020204" pitchFamily="34" charset="0"/>
+              </a:rPr>
+              <a:t>      </a:t>
+            </a:r>
+            <a:r>
+              <a:rPr lang="en-US" sz="1920" dirty="0" err="1">
+                <a:latin typeface="Arial" panose="020B0604020202020204" pitchFamily="34" charset="0"/>
+                <a:cs typeface="Arial" panose="020B0604020202020204" pitchFamily="34" charset="0"/>
+              </a:rPr>
+              <a:t>T</a:t>
+            </a:r>
+            <a:r>
+              <a:rPr lang="en-US" sz="1920" baseline="-25000" dirty="0" err="1">
+                <a:latin typeface="Arial" panose="020B0604020202020204" pitchFamily="34" charset="0"/>
+                <a:cs typeface="Arial" panose="020B0604020202020204" pitchFamily="34" charset="0"/>
+              </a:rPr>
+              <a:t>bb</a:t>
+            </a:r>
+            <a:r>
+              <a:rPr lang="en-US" sz="1920" dirty="0">
+                <a:latin typeface="Arial" panose="020B0604020202020204" pitchFamily="34" charset="0"/>
+                <a:cs typeface="Arial" panose="020B0604020202020204" pitchFamily="34" charset="0"/>
+              </a:rPr>
+              <a:t>=1e6 K</a:t>
+            </a:r>
+          </a:p>
+          <a:p>
+            <a:r>
+              <a:rPr lang="en-US" sz="1920" dirty="0">
+                <a:latin typeface="Arial" panose="020B0604020202020204" pitchFamily="34" charset="0"/>
+                <a:cs typeface="Arial" panose="020B0604020202020204" pitchFamily="34" charset="0"/>
+              </a:rPr>
+              <a:t>      </a:t>
+            </a:r>
+            <a:r>
+              <a:rPr lang="en-US" sz="1920" dirty="0" err="1">
+                <a:latin typeface="Arial" panose="020B0604020202020204" pitchFamily="34" charset="0"/>
+                <a:cs typeface="Arial" panose="020B0604020202020204" pitchFamily="34" charset="0"/>
+              </a:rPr>
+              <a:t>T</a:t>
+            </a:r>
+            <a:r>
+              <a:rPr lang="en-US" sz="1920" baseline="-25000" dirty="0" err="1">
+                <a:latin typeface="Arial" panose="020B0604020202020204" pitchFamily="34" charset="0"/>
+                <a:cs typeface="Arial" panose="020B0604020202020204" pitchFamily="34" charset="0"/>
+              </a:rPr>
+              <a:t>bb</a:t>
+            </a:r>
+            <a:r>
+              <a:rPr lang="en-US" sz="1920" dirty="0">
+                <a:latin typeface="Arial" panose="020B0604020202020204" pitchFamily="34" charset="0"/>
+                <a:cs typeface="Arial" panose="020B0604020202020204" pitchFamily="34" charset="0"/>
+              </a:rPr>
+              <a:t>=1e7 K</a:t>
+            </a:r>
+          </a:p>
+        </p:txBody>
+      </p:sp>
+      <p:sp>
+        <p:nvSpPr>
+          <p:cNvPr id="12" name="Rectangle 11"/>
+          <p:cNvSpPr>
+            <a:spLocks noChangeAspect="1"/>
+          </p:cNvSpPr>
+          <p:nvPr/>
+        </p:nvSpPr>
+        <p:spPr>
+          <a:xfrm>
+            <a:off x="3516597" y="4751462"/>
+            <a:ext cx="165811" cy="165811"/>
           </a:xfrm>
           <a:prstGeom prst="rect">
             <a:avLst/>
@@ -3804,20 +4029,22 @@
           <a:lstStyle/>
           <a:p>
             <a:pPr algn="ctr"/>
-            <a:endParaRPr lang="en-US"/>
-          </a:p>
-        </p:txBody>
-      </p:sp>
-      <p:sp>
-        <p:nvSpPr>
-          <p:cNvPr id="10" name="Oval 9"/>
-          <p:cNvSpPr/>
+            <a:endParaRPr lang="en-US" sz="1920" dirty="0"/>
+          </a:p>
+        </p:txBody>
+      </p:sp>
+      <p:sp>
+        <p:nvSpPr>
+          <p:cNvPr id="15" name="Oval 14"/>
+          <p:cNvSpPr>
+            <a:spLocks noChangeAspect="1"/>
+          </p:cNvSpPr>
           <p:nvPr/>
         </p:nvSpPr>
         <p:spPr>
           <a:xfrm>
-            <a:off x="4222570" y="4645844"/>
-            <a:ext cx="314921" cy="172006"/>
+            <a:off x="3514449" y="5021118"/>
+            <a:ext cx="165811" cy="165811"/>
           </a:xfrm>
           <a:prstGeom prst="ellipse">
             <a:avLst/>
@@ -3844,20 +4071,22 @@
           <a:lstStyle/>
           <a:p>
             <a:pPr algn="ctr"/>
-            <a:endParaRPr lang="en-US"/>
-          </a:p>
-        </p:txBody>
-      </p:sp>
-      <p:sp>
-        <p:nvSpPr>
-          <p:cNvPr id="11" name="5-Point Star 10"/>
-          <p:cNvSpPr/>
+            <a:endParaRPr lang="en-US" sz="1920"/>
+          </a:p>
+        </p:txBody>
+      </p:sp>
+      <p:sp>
+        <p:nvSpPr>
+          <p:cNvPr id="16" name="5-Point Star 15"/>
+          <p:cNvSpPr>
+            <a:spLocks noChangeAspect="1"/>
+          </p:cNvSpPr>
           <p:nvPr/>
         </p:nvSpPr>
         <p:spPr>
           <a:xfrm>
-            <a:off x="4309804" y="4888011"/>
-            <a:ext cx="157461" cy="181568"/>
+            <a:off x="3527096" y="5290775"/>
+            <a:ext cx="165811" cy="165811"/>
           </a:xfrm>
           <a:prstGeom prst="star5">
             <a:avLst/>
@@ -3884,20 +4113,22 @@
           <a:lstStyle/>
           <a:p>
             <a:pPr algn="ctr"/>
-            <a:endParaRPr lang="en-US" dirty="0"/>
-          </a:p>
-        </p:txBody>
-      </p:sp>
-      <p:sp>
-        <p:nvSpPr>
-          <p:cNvPr id="13" name="Isosceles Triangle 12"/>
-          <p:cNvSpPr/>
+            <a:endParaRPr lang="en-US" sz="1920" dirty="0"/>
+          </a:p>
+        </p:txBody>
+      </p:sp>
+      <p:sp>
+        <p:nvSpPr>
+          <p:cNvPr id="17" name="Isosceles Triangle 16"/>
+          <p:cNvSpPr>
+            <a:spLocks noChangeAspect="1"/>
+          </p:cNvSpPr>
           <p:nvPr/>
         </p:nvSpPr>
         <p:spPr>
           <a:xfrm>
-            <a:off x="4309804" y="5121633"/>
-            <a:ext cx="167304" cy="172012"/>
+            <a:off x="3509605" y="5560431"/>
+            <a:ext cx="175499" cy="165811"/>
           </a:xfrm>
           <a:prstGeom prst="triangle">
             <a:avLst/>
@@ -3924,159 +4155,7 @@
           <a:lstStyle/>
           <a:p>
             <a:pPr algn="ctr"/>
-            <a:endParaRPr lang="en-US"/>
-          </a:p>
-        </p:txBody>
-      </p:sp>
-      <p:sp>
-        <p:nvSpPr>
-          <p:cNvPr id="14" name="TextBox 13"/>
-          <p:cNvSpPr txBox="1"/>
-          <p:nvPr/>
-        </p:nvSpPr>
-        <p:spPr>
-          <a:xfrm>
-            <a:off x="4155056" y="3907180"/>
-            <a:ext cx="1940944" cy="1477328"/>
-          </a:xfrm>
-          <a:prstGeom prst="rect">
-            <a:avLst/>
-          </a:prstGeom>
-          <a:noFill/>
-        </p:spPr>
-        <p:txBody>
-          <a:bodyPr wrap="square" rtlCol="0">
-            <a:spAutoFit/>
-          </a:bodyPr>
-          <a:lstStyle/>
-          <a:p>
-            <a:r>
-              <a:rPr lang="en-US" dirty="0">
-                <a:latin typeface="Arial" panose="020B0604020202020204" pitchFamily="34" charset="0"/>
-                <a:cs typeface="Arial" panose="020B0604020202020204" pitchFamily="34" charset="0"/>
-              </a:rPr>
-              <a:t>Legend:</a:t>
-            </a:r>
-          </a:p>
-          <a:p>
-            <a:r>
-              <a:rPr lang="en-US" dirty="0">
-                <a:latin typeface="Arial" panose="020B0604020202020204" pitchFamily="34" charset="0"/>
-                <a:cs typeface="Arial" panose="020B0604020202020204" pitchFamily="34" charset="0"/>
-              </a:rPr>
-              <a:t>      </a:t>
-            </a:r>
-            <a:r>
-              <a:rPr lang="en-US" dirty="0" err="1">
-                <a:latin typeface="Arial" panose="020B0604020202020204" pitchFamily="34" charset="0"/>
-                <a:cs typeface="Arial" panose="020B0604020202020204" pitchFamily="34" charset="0"/>
-              </a:rPr>
-              <a:t>T</a:t>
-            </a:r>
-            <a:r>
-              <a:rPr lang="en-US" baseline="-25000" dirty="0" err="1">
-                <a:latin typeface="Arial" panose="020B0604020202020204" pitchFamily="34" charset="0"/>
-                <a:cs typeface="Arial" panose="020B0604020202020204" pitchFamily="34" charset="0"/>
-              </a:rPr>
-              <a:t>bb</a:t>
-            </a:r>
-            <a:r>
-              <a:rPr lang="en-US" dirty="0">
-                <a:latin typeface="Arial" panose="020B0604020202020204" pitchFamily="34" charset="0"/>
-                <a:cs typeface="Arial" panose="020B0604020202020204" pitchFamily="34" charset="0"/>
-              </a:rPr>
-              <a:t>=1e4 K</a:t>
-            </a:r>
-          </a:p>
-          <a:p>
-            <a:r>
-              <a:rPr lang="en-US" dirty="0">
-                <a:latin typeface="Arial" panose="020B0604020202020204" pitchFamily="34" charset="0"/>
-                <a:cs typeface="Arial" panose="020B0604020202020204" pitchFamily="34" charset="0"/>
-              </a:rPr>
-              <a:t>      </a:t>
-            </a:r>
-            <a:r>
-              <a:rPr lang="en-US" dirty="0" err="1">
-                <a:latin typeface="Arial" panose="020B0604020202020204" pitchFamily="34" charset="0"/>
-                <a:cs typeface="Arial" panose="020B0604020202020204" pitchFamily="34" charset="0"/>
-              </a:rPr>
-              <a:t>T</a:t>
-            </a:r>
-            <a:r>
-              <a:rPr lang="en-US" baseline="-25000" dirty="0" err="1">
-                <a:latin typeface="Arial" panose="020B0604020202020204" pitchFamily="34" charset="0"/>
-                <a:cs typeface="Arial" panose="020B0604020202020204" pitchFamily="34" charset="0"/>
-              </a:rPr>
-              <a:t>bb</a:t>
-            </a:r>
-            <a:r>
-              <a:rPr lang="en-US" dirty="0">
-                <a:latin typeface="Arial" panose="020B0604020202020204" pitchFamily="34" charset="0"/>
-                <a:cs typeface="Arial" panose="020B0604020202020204" pitchFamily="34" charset="0"/>
-              </a:rPr>
-              <a:t>=1e5 K</a:t>
-            </a:r>
-          </a:p>
-          <a:p>
-            <a:r>
-              <a:rPr lang="en-US" dirty="0">
-                <a:latin typeface="Arial" panose="020B0604020202020204" pitchFamily="34" charset="0"/>
-                <a:cs typeface="Arial" panose="020B0604020202020204" pitchFamily="34" charset="0"/>
-              </a:rPr>
-              <a:t>      </a:t>
-            </a:r>
-            <a:r>
-              <a:rPr lang="en-US" dirty="0" err="1">
-                <a:latin typeface="Arial" panose="020B0604020202020204" pitchFamily="34" charset="0"/>
-                <a:cs typeface="Arial" panose="020B0604020202020204" pitchFamily="34" charset="0"/>
-              </a:rPr>
-              <a:t>T</a:t>
-            </a:r>
-            <a:r>
-              <a:rPr lang="en-US" baseline="-25000" dirty="0" err="1">
-                <a:latin typeface="Arial" panose="020B0604020202020204" pitchFamily="34" charset="0"/>
-                <a:cs typeface="Arial" panose="020B0604020202020204" pitchFamily="34" charset="0"/>
-              </a:rPr>
-              <a:t>bb</a:t>
-            </a:r>
-            <a:r>
-              <a:rPr lang="en-US" dirty="0">
-                <a:latin typeface="Arial" panose="020B0604020202020204" pitchFamily="34" charset="0"/>
-                <a:cs typeface="Arial" panose="020B0604020202020204" pitchFamily="34" charset="0"/>
-              </a:rPr>
-              <a:t>=1e6 K</a:t>
-            </a:r>
-          </a:p>
-          <a:p>
-            <a:r>
-              <a:rPr lang="en-US" dirty="0">
-                <a:latin typeface="Arial" panose="020B0604020202020204" pitchFamily="34" charset="0"/>
-                <a:cs typeface="Arial" panose="020B0604020202020204" pitchFamily="34" charset="0"/>
-              </a:rPr>
-              <a:t>      </a:t>
-            </a:r>
-            <a:r>
-              <a:rPr lang="en-US" dirty="0" err="1">
-                <a:latin typeface="Arial" panose="020B0604020202020204" pitchFamily="34" charset="0"/>
-                <a:cs typeface="Arial" panose="020B0604020202020204" pitchFamily="34" charset="0"/>
-              </a:rPr>
-              <a:t>T</a:t>
-            </a:r>
-            <a:r>
-              <a:rPr lang="en-US" baseline="-25000" dirty="0" err="1">
-                <a:latin typeface="Arial" panose="020B0604020202020204" pitchFamily="34" charset="0"/>
-                <a:cs typeface="Arial" panose="020B0604020202020204" pitchFamily="34" charset="0"/>
-              </a:rPr>
-              <a:t>bb</a:t>
-            </a:r>
-            <a:r>
-              <a:rPr lang="en-US" dirty="0">
-                <a:latin typeface="Arial" panose="020B0604020202020204" pitchFamily="34" charset="0"/>
-                <a:cs typeface="Arial" panose="020B0604020202020204" pitchFamily="34" charset="0"/>
-              </a:rPr>
-              <a:t>=1e7 K</a:t>
-            </a:r>
+            <a:endParaRPr lang="en-US" sz="1920" dirty="0"/>
           </a:p>
         </p:txBody>
       </p:sp>
@@ -4126,7 +4205,7 @@
 <file path=ppt/theme/theme1.xml><?xml version="1.0" encoding="utf-8"?>
 <a:theme xmlns:a="http://schemas.openxmlformats.org/drawingml/2006/main" name="Office Theme">
   <a:themeElements>
-    <a:clrScheme name="Office">
+    <a:clrScheme name="Office Theme">
       <a:dk1>
         <a:sysClr val="windowText" lastClr="000000"/>
       </a:dk1>
@@ -4164,7 +4243,7 @@
         <a:srgbClr val="954F72"/>
       </a:folHlink>
     </a:clrScheme>
-    <a:fontScheme name="Office">
+    <a:fontScheme name="Office Theme">
       <a:majorFont>
         <a:latin typeface="Calibri Light" panose="020F0302020204030204"/>
         <a:ea typeface=""/>
@@ -4199,23 +4278,6 @@
         <a:font script="Viet" typeface="Times New Roman"/>
         <a:font script="Uigh" typeface="Microsoft Uighur"/>
         <a:font script="Geor" typeface="Sylfaen"/>
-        <a:font script="Armn" typeface="Arial"/>
-        <a:font script="Bugi" typeface="Leelawadee UI"/>
-        <a:font script="Bopo" typeface="Microsoft JhengHei"/>
-        <a:font script="Java" typeface="Javanese Text"/>
-        <a:font script="Lisu" typeface="Segoe UI"/>
-        <a:font script="Mymr" typeface="Myanmar Text"/>
-        <a:font script="Nkoo" typeface="Ebrima"/>
-        <a:font script="Olck" typeface="Nirmala UI"/>
-        <a:font script="Osma" typeface="Ebrima"/>
-        <a:font script="Phag" typeface="Phagspa"/>
-        <a:font script="Syrn" typeface="Estrangelo Edessa"/>
-        <a:font script="Syrj" typeface="Estrangelo Edessa"/>
-        <a:font script="Syre" typeface="Estrangelo Edessa"/>
-        <a:font script="Sora" typeface="Nirmala UI"/>
-        <a:font script="Tale" typeface="Microsoft Tai Le"/>
-        <a:font script="Talu" typeface="Microsoft New Tai Lue"/>
-        <a:font script="Tfng" typeface="Ebrima"/>
       </a:majorFont>
       <a:minorFont>
         <a:latin typeface="Calibri" panose="020F0502020204030204"/>
@@ -4251,26 +4313,9 @@
         <a:font script="Viet" typeface="Arial"/>
         <a:font script="Uigh" typeface="Microsoft Uighur"/>
         <a:font script="Geor" typeface="Sylfaen"/>
-        <a:font script="Armn" typeface="Arial"/>
-        <a:font script="Bugi" typeface="Leelawadee UI"/>
-        <a:font script="Bopo" typeface="Microsoft JhengHei"/>
-        <a:font script="Java" typeface="Javanese Text"/>
-        <a:font script="Lisu" typeface="Segoe UI"/>
-        <a:font script="Mymr" typeface="Myanmar Text"/>
-        <a:font script="Nkoo" typeface="Ebrima"/>
-        <a:font script="Olck" typeface="Nirmala UI"/>
-        <a:font script="Osma" typeface="Ebrima"/>
-        <a:font script="Phag" typeface="Phagspa"/>
-        <a:font script="Syrn" typeface="Estrangelo Edessa"/>
-        <a:font script="Syrj" typeface="Estrangelo Edessa"/>
-        <a:font script="Syre" typeface="Estrangelo Edessa"/>
-        <a:font script="Sora" typeface="Nirmala UI"/>
-        <a:font script="Tale" typeface="Microsoft Tai Le"/>
-        <a:font script="Talu" typeface="Microsoft New Tai Lue"/>
-        <a:font script="Tfng" typeface="Ebrima"/>
       </a:minorFont>
     </a:fontScheme>
-    <a:fmtScheme name="Office">
+    <a:fmtScheme name="Office Theme">
       <a:fillStyleLst>
         <a:solidFill>
           <a:schemeClr val="phClr"/>

</xml_diff>

<commit_message>
edited poster design.  Left a few comments in the powerpoint
</commit_message>
<xml_diff>
--- a/GrovesImagesWithData.pptx
+++ b/GrovesImagesWithData.pptx
@@ -110,7 +110,7 @@
   <p:extLst>
     <p:ext uri="{EFAFB233-063F-42B5-8137-9DF3F51BA10A}">
       <p15:sldGuideLst xmlns:p15="http://schemas.microsoft.com/office/powerpoint/2012/main">
-        <p15:guide id="1" orient="horz" pos="2304" userDrawn="1">
+        <p15:guide id="1" orient="horz" pos="2328" userDrawn="1">
           <p15:clr>
             <a:srgbClr val="A4A3A4"/>
           </p15:clr>
@@ -257,7 +257,7 @@
           <a:p>
             <a:fld id="{7B82208D-E5F7-432D-B783-0485AA1D065E}" type="datetimeFigureOut">
               <a:rPr lang="en-US" smtClean="0"/>
-              <a:t>4/18/2016</a:t>
+              <a:t>4/19/2016</a:t>
             </a:fld>
             <a:endParaRPr lang="en-US"/>
           </a:p>
@@ -427,7 +427,7 @@
           <a:p>
             <a:fld id="{7B82208D-E5F7-432D-B783-0485AA1D065E}" type="datetimeFigureOut">
               <a:rPr lang="en-US" smtClean="0"/>
-              <a:t>4/18/2016</a:t>
+              <a:t>4/19/2016</a:t>
             </a:fld>
             <a:endParaRPr lang="en-US"/>
           </a:p>
@@ -607,7 +607,7 @@
           <a:p>
             <a:fld id="{7B82208D-E5F7-432D-B783-0485AA1D065E}" type="datetimeFigureOut">
               <a:rPr lang="en-US" smtClean="0"/>
-              <a:t>4/18/2016</a:t>
+              <a:t>4/19/2016</a:t>
             </a:fld>
             <a:endParaRPr lang="en-US"/>
           </a:p>
@@ -777,7 +777,7 @@
           <a:p>
             <a:fld id="{7B82208D-E5F7-432D-B783-0485AA1D065E}" type="datetimeFigureOut">
               <a:rPr lang="en-US" smtClean="0"/>
-              <a:t>4/18/2016</a:t>
+              <a:t>4/19/2016</a:t>
             </a:fld>
             <a:endParaRPr lang="en-US"/>
           </a:p>
@@ -1021,7 +1021,7 @@
           <a:p>
             <a:fld id="{7B82208D-E5F7-432D-B783-0485AA1D065E}" type="datetimeFigureOut">
               <a:rPr lang="en-US" smtClean="0"/>
-              <a:t>4/18/2016</a:t>
+              <a:t>4/19/2016</a:t>
             </a:fld>
             <a:endParaRPr lang="en-US"/>
           </a:p>
@@ -1253,7 +1253,7 @@
           <a:p>
             <a:fld id="{7B82208D-E5F7-432D-B783-0485AA1D065E}" type="datetimeFigureOut">
               <a:rPr lang="en-US" smtClean="0"/>
-              <a:t>4/18/2016</a:t>
+              <a:t>4/19/2016</a:t>
             </a:fld>
             <a:endParaRPr lang="en-US"/>
           </a:p>
@@ -1620,7 +1620,7 @@
           <a:p>
             <a:fld id="{7B82208D-E5F7-432D-B783-0485AA1D065E}" type="datetimeFigureOut">
               <a:rPr lang="en-US" smtClean="0"/>
-              <a:t>4/18/2016</a:t>
+              <a:t>4/19/2016</a:t>
             </a:fld>
             <a:endParaRPr lang="en-US"/>
           </a:p>
@@ -1738,7 +1738,7 @@
           <a:p>
             <a:fld id="{7B82208D-E5F7-432D-B783-0485AA1D065E}" type="datetimeFigureOut">
               <a:rPr lang="en-US" smtClean="0"/>
-              <a:t>4/18/2016</a:t>
+              <a:t>4/19/2016</a:t>
             </a:fld>
             <a:endParaRPr lang="en-US"/>
           </a:p>
@@ -1833,7 +1833,7 @@
           <a:p>
             <a:fld id="{7B82208D-E5F7-432D-B783-0485AA1D065E}" type="datetimeFigureOut">
               <a:rPr lang="en-US" smtClean="0"/>
-              <a:t>4/18/2016</a:t>
+              <a:t>4/19/2016</a:t>
             </a:fld>
             <a:endParaRPr lang="en-US"/>
           </a:p>
@@ -2110,7 +2110,7 @@
           <a:p>
             <a:fld id="{7B82208D-E5F7-432D-B783-0485AA1D065E}" type="datetimeFigureOut">
               <a:rPr lang="en-US" smtClean="0"/>
-              <a:t>4/18/2016</a:t>
+              <a:t>4/19/2016</a:t>
             </a:fld>
             <a:endParaRPr lang="en-US"/>
           </a:p>
@@ -2367,7 +2367,7 @@
           <a:p>
             <a:fld id="{7B82208D-E5F7-432D-B783-0485AA1D065E}" type="datetimeFigureOut">
               <a:rPr lang="en-US" smtClean="0"/>
-              <a:t>4/18/2016</a:t>
+              <a:t>4/19/2016</a:t>
             </a:fld>
             <a:endParaRPr lang="en-US"/>
           </a:p>
@@ -2580,7 +2580,7 @@
           <a:p>
             <a:fld id="{7B82208D-E5F7-432D-B783-0485AA1D065E}" type="datetimeFigureOut">
               <a:rPr lang="en-US" smtClean="0"/>
-              <a:t>4/18/2016</a:t>
+              <a:t>4/19/2016</a:t>
             </a:fld>
             <a:endParaRPr lang="en-US"/>
           </a:p>
@@ -3556,8 +3556,8 @@
         </p:blipFill>
         <p:spPr>
           <a:xfrm>
-            <a:off x="1124085" y="899441"/>
-            <a:ext cx="6917758" cy="5084393"/>
+            <a:off x="972893" y="728472"/>
+            <a:ext cx="8074342" cy="5934456"/>
           </a:xfrm>
           <a:prstGeom prst="rect">
             <a:avLst/>
@@ -3574,8 +3574,8 @@
         </p:nvSpPr>
         <p:spPr>
           <a:xfrm>
-            <a:off x="2849881" y="1767841"/>
-            <a:ext cx="132080" cy="132080"/>
+            <a:off x="2341626" y="1672575"/>
+            <a:ext cx="169110" cy="169110"/>
           </a:xfrm>
           <a:prstGeom prst="rect">
             <a:avLst/>
@@ -3604,6 +3604,457 @@
             </a:prstTxWarp>
             <a:noAutofit/>
           </a:bodyPr>
+          <a:lstStyle/>
+          <a:p>
+            <a:pPr algn="ctr"/>
+            <a:endParaRPr lang="en-US" sz="1920"/>
+          </a:p>
+        </p:txBody>
+      </p:sp>
+      <p:sp>
+        <p:nvSpPr>
+          <p:cNvPr id="4" name="Oval 3"/>
+          <p:cNvSpPr>
+            <a:spLocks noChangeAspect="1"/>
+          </p:cNvSpPr>
+          <p:nvPr/>
+        </p:nvSpPr>
+        <p:spPr>
+          <a:xfrm>
+            <a:off x="2514499" y="1920962"/>
+            <a:ext cx="170819" cy="169110"/>
+          </a:xfrm>
+          <a:prstGeom prst="ellipse">
+            <a:avLst/>
+          </a:prstGeom>
+        </p:spPr>
+        <p:style>
+          <a:lnRef idx="2">
+            <a:schemeClr val="accent1">
+              <a:shade val="50000"/>
+            </a:schemeClr>
+          </a:lnRef>
+          <a:fillRef idx="1">
+            <a:schemeClr val="accent1"/>
+          </a:fillRef>
+          <a:effectRef idx="0">
+            <a:schemeClr val="accent1"/>
+          </a:effectRef>
+          <a:fontRef idx="minor">
+            <a:schemeClr val="lt1"/>
+          </a:fontRef>
+        </p:style>
+        <p:txBody>
+          <a:bodyPr rtlCol="0" anchor="ctr"/>
+          <a:lstStyle/>
+          <a:p>
+            <a:pPr algn="ctr"/>
+            <a:endParaRPr lang="en-US" dirty="0"/>
+          </a:p>
+        </p:txBody>
+      </p:sp>
+      <p:sp>
+        <p:nvSpPr>
+          <p:cNvPr id="5" name="5-Point Star 4"/>
+          <p:cNvSpPr>
+            <a:spLocks noChangeAspect="1"/>
+          </p:cNvSpPr>
+          <p:nvPr/>
+        </p:nvSpPr>
+        <p:spPr>
+          <a:xfrm>
+            <a:off x="2602421" y="1836075"/>
+            <a:ext cx="165794" cy="169774"/>
+          </a:xfrm>
+          <a:prstGeom prst="star5">
+            <a:avLst/>
+          </a:prstGeom>
+        </p:spPr>
+        <p:style>
+          <a:lnRef idx="2">
+            <a:schemeClr val="accent1">
+              <a:shade val="50000"/>
+            </a:schemeClr>
+          </a:lnRef>
+          <a:fillRef idx="1">
+            <a:schemeClr val="accent1"/>
+          </a:fillRef>
+          <a:effectRef idx="0">
+            <a:schemeClr val="accent1"/>
+          </a:effectRef>
+          <a:fontRef idx="minor">
+            <a:schemeClr val="lt1"/>
+          </a:fontRef>
+        </p:style>
+        <p:txBody>
+          <a:bodyPr rtlCol="0" anchor="ctr"/>
+          <a:lstStyle/>
+          <a:p>
+            <a:pPr algn="ctr"/>
+            <a:endParaRPr lang="en-US" sz="1920"/>
+          </a:p>
+        </p:txBody>
+      </p:sp>
+      <p:sp>
+        <p:nvSpPr>
+          <p:cNvPr id="6" name="Isosceles Triangle 5"/>
+          <p:cNvSpPr>
+            <a:spLocks noChangeAspect="1"/>
+          </p:cNvSpPr>
+          <p:nvPr/>
+        </p:nvSpPr>
+        <p:spPr>
+          <a:xfrm>
+            <a:off x="3308444" y="1268779"/>
+            <a:ext cx="165467" cy="169110"/>
+          </a:xfrm>
+          <a:prstGeom prst="triangle">
+            <a:avLst/>
+          </a:prstGeom>
+        </p:spPr>
+        <p:style>
+          <a:lnRef idx="2">
+            <a:schemeClr val="accent1">
+              <a:shade val="50000"/>
+            </a:schemeClr>
+          </a:lnRef>
+          <a:fillRef idx="1">
+            <a:schemeClr val="accent1"/>
+          </a:fillRef>
+          <a:effectRef idx="0">
+            <a:schemeClr val="accent1"/>
+          </a:effectRef>
+          <a:fontRef idx="minor">
+            <a:schemeClr val="lt1"/>
+          </a:fontRef>
+        </p:style>
+        <p:txBody>
+          <a:bodyPr rtlCol="0" anchor="ctr"/>
+          <a:lstStyle/>
+          <a:p>
+            <a:pPr algn="ctr"/>
+            <a:endParaRPr lang="en-US" sz="1920"/>
+          </a:p>
+        </p:txBody>
+      </p:sp>
+      <p:sp>
+        <p:nvSpPr>
+          <p:cNvPr id="8" name="TextBox 7"/>
+          <p:cNvSpPr txBox="1"/>
+          <p:nvPr/>
+        </p:nvSpPr>
+        <p:spPr>
+          <a:xfrm>
+            <a:off x="2381104" y="4087536"/>
+            <a:ext cx="2185615" cy="1569660"/>
+          </a:xfrm>
+          <a:prstGeom prst="rect">
+            <a:avLst/>
+          </a:prstGeom>
+          <a:noFill/>
+        </p:spPr>
+        <p:txBody>
+          <a:bodyPr wrap="square" rtlCol="0">
+            <a:spAutoFit/>
+          </a:bodyPr>
+          <a:lstStyle/>
+          <a:p>
+            <a:r>
+              <a:rPr lang="en-US" sz="1920" dirty="0">
+                <a:latin typeface="Arial" panose="020B0604020202020204" pitchFamily="34" charset="0"/>
+                <a:cs typeface="Arial" panose="020B0604020202020204" pitchFamily="34" charset="0"/>
+              </a:rPr>
+              <a:t>Legend:</a:t>
+            </a:r>
+          </a:p>
+          <a:p>
+            <a:r>
+              <a:rPr lang="en-US" sz="1920" dirty="0">
+                <a:latin typeface="Arial" panose="020B0604020202020204" pitchFamily="34" charset="0"/>
+                <a:cs typeface="Arial" panose="020B0604020202020204" pitchFamily="34" charset="0"/>
+              </a:rPr>
+              <a:t>      </a:t>
+            </a:r>
+            <a:r>
+              <a:rPr lang="en-US" sz="1920" dirty="0" err="1">
+                <a:latin typeface="Arial" panose="020B0604020202020204" pitchFamily="34" charset="0"/>
+                <a:cs typeface="Arial" panose="020B0604020202020204" pitchFamily="34" charset="0"/>
+              </a:rPr>
+              <a:t>T</a:t>
+            </a:r>
+            <a:r>
+              <a:rPr lang="en-US" sz="1920" baseline="-25000" dirty="0" err="1">
+                <a:latin typeface="Arial" panose="020B0604020202020204" pitchFamily="34" charset="0"/>
+                <a:cs typeface="Arial" panose="020B0604020202020204" pitchFamily="34" charset="0"/>
+              </a:rPr>
+              <a:t>bb</a:t>
+            </a:r>
+            <a:r>
+              <a:rPr lang="en-US" sz="1920" dirty="0">
+                <a:latin typeface="Arial" panose="020B0604020202020204" pitchFamily="34" charset="0"/>
+                <a:cs typeface="Arial" panose="020B0604020202020204" pitchFamily="34" charset="0"/>
+              </a:rPr>
+              <a:t>=1e4 K</a:t>
+            </a:r>
+          </a:p>
+          <a:p>
+            <a:r>
+              <a:rPr lang="en-US" sz="1920" dirty="0">
+                <a:latin typeface="Arial" panose="020B0604020202020204" pitchFamily="34" charset="0"/>
+                <a:cs typeface="Arial" panose="020B0604020202020204" pitchFamily="34" charset="0"/>
+              </a:rPr>
+              <a:t>      </a:t>
+            </a:r>
+            <a:r>
+              <a:rPr lang="en-US" sz="1920" dirty="0" err="1">
+                <a:latin typeface="Arial" panose="020B0604020202020204" pitchFamily="34" charset="0"/>
+                <a:cs typeface="Arial" panose="020B0604020202020204" pitchFamily="34" charset="0"/>
+              </a:rPr>
+              <a:t>T</a:t>
+            </a:r>
+            <a:r>
+              <a:rPr lang="en-US" sz="1920" baseline="-25000" dirty="0" err="1">
+                <a:latin typeface="Arial" panose="020B0604020202020204" pitchFamily="34" charset="0"/>
+                <a:cs typeface="Arial" panose="020B0604020202020204" pitchFamily="34" charset="0"/>
+              </a:rPr>
+              <a:t>bb</a:t>
+            </a:r>
+            <a:r>
+              <a:rPr lang="en-US" sz="1920" dirty="0">
+                <a:latin typeface="Arial" panose="020B0604020202020204" pitchFamily="34" charset="0"/>
+                <a:cs typeface="Arial" panose="020B0604020202020204" pitchFamily="34" charset="0"/>
+              </a:rPr>
+              <a:t>=1e5 K</a:t>
+            </a:r>
+          </a:p>
+          <a:p>
+            <a:r>
+              <a:rPr lang="en-US" sz="1920" dirty="0">
+                <a:latin typeface="Arial" panose="020B0604020202020204" pitchFamily="34" charset="0"/>
+                <a:cs typeface="Arial" panose="020B0604020202020204" pitchFamily="34" charset="0"/>
+              </a:rPr>
+              <a:t>      </a:t>
+            </a:r>
+            <a:r>
+              <a:rPr lang="en-US" sz="1920" dirty="0" err="1">
+                <a:latin typeface="Arial" panose="020B0604020202020204" pitchFamily="34" charset="0"/>
+                <a:cs typeface="Arial" panose="020B0604020202020204" pitchFamily="34" charset="0"/>
+              </a:rPr>
+              <a:t>T</a:t>
+            </a:r>
+            <a:r>
+              <a:rPr lang="en-US" sz="1920" baseline="-25000" dirty="0" err="1">
+                <a:latin typeface="Arial" panose="020B0604020202020204" pitchFamily="34" charset="0"/>
+                <a:cs typeface="Arial" panose="020B0604020202020204" pitchFamily="34" charset="0"/>
+              </a:rPr>
+              <a:t>bb</a:t>
+            </a:r>
+            <a:r>
+              <a:rPr lang="en-US" sz="1920" dirty="0">
+                <a:latin typeface="Arial" panose="020B0604020202020204" pitchFamily="34" charset="0"/>
+                <a:cs typeface="Arial" panose="020B0604020202020204" pitchFamily="34" charset="0"/>
+              </a:rPr>
+              <a:t>=1e6 K</a:t>
+            </a:r>
+          </a:p>
+          <a:p>
+            <a:r>
+              <a:rPr lang="en-US" sz="1920" dirty="0">
+                <a:latin typeface="Arial" panose="020B0604020202020204" pitchFamily="34" charset="0"/>
+                <a:cs typeface="Arial" panose="020B0604020202020204" pitchFamily="34" charset="0"/>
+              </a:rPr>
+              <a:t>      </a:t>
+            </a:r>
+            <a:r>
+              <a:rPr lang="en-US" sz="1920" dirty="0" err="1">
+                <a:latin typeface="Arial" panose="020B0604020202020204" pitchFamily="34" charset="0"/>
+                <a:cs typeface="Arial" panose="020B0604020202020204" pitchFamily="34" charset="0"/>
+              </a:rPr>
+              <a:t>T</a:t>
+            </a:r>
+            <a:r>
+              <a:rPr lang="en-US" sz="1920" baseline="-25000" dirty="0" err="1">
+                <a:latin typeface="Arial" panose="020B0604020202020204" pitchFamily="34" charset="0"/>
+                <a:cs typeface="Arial" panose="020B0604020202020204" pitchFamily="34" charset="0"/>
+              </a:rPr>
+              <a:t>bb</a:t>
+            </a:r>
+            <a:r>
+              <a:rPr lang="en-US" sz="1920" dirty="0">
+                <a:latin typeface="Arial" panose="020B0604020202020204" pitchFamily="34" charset="0"/>
+                <a:cs typeface="Arial" panose="020B0604020202020204" pitchFamily="34" charset="0"/>
+              </a:rPr>
+              <a:t>=1e7 K</a:t>
+            </a:r>
+          </a:p>
+        </p:txBody>
+      </p:sp>
+      <p:sp>
+        <p:nvSpPr>
+          <p:cNvPr id="9" name="Rectangle 8"/>
+          <p:cNvSpPr>
+            <a:spLocks noChangeAspect="1"/>
+          </p:cNvSpPr>
+          <p:nvPr/>
+        </p:nvSpPr>
+        <p:spPr>
+          <a:xfrm>
+            <a:off x="2510874" y="4524795"/>
+            <a:ext cx="169110" cy="169110"/>
+          </a:xfrm>
+          <a:prstGeom prst="rect">
+            <a:avLst/>
+          </a:prstGeom>
+        </p:spPr>
+        <p:style>
+          <a:lnRef idx="2">
+            <a:schemeClr val="accent1">
+              <a:shade val="50000"/>
+            </a:schemeClr>
+          </a:lnRef>
+          <a:fillRef idx="1">
+            <a:schemeClr val="accent1"/>
+          </a:fillRef>
+          <a:effectRef idx="0">
+            <a:schemeClr val="accent1"/>
+          </a:effectRef>
+          <a:fontRef idx="minor">
+            <a:schemeClr val="lt1"/>
+          </a:fontRef>
+        </p:style>
+        <p:txBody>
+          <a:bodyPr rot="0" spcFirstLastPara="0" vertOverflow="overflow" horzOverflow="overflow" vert="horz" wrap="square" lIns="97536" tIns="48768" rIns="97536" bIns="48768" numCol="1" spcCol="0" rtlCol="0" fromWordArt="0" anchor="ctr" anchorCtr="0" forceAA="0" compatLnSpc="1">
+            <a:prstTxWarp prst="textNoShape">
+              <a:avLst/>
+            </a:prstTxWarp>
+            <a:noAutofit/>
+          </a:bodyPr>
+          <a:lstStyle/>
+          <a:p>
+            <a:pPr algn="ctr"/>
+            <a:endParaRPr lang="en-US" sz="1920"/>
+          </a:p>
+        </p:txBody>
+      </p:sp>
+      <p:sp>
+        <p:nvSpPr>
+          <p:cNvPr id="10" name="Oval 9"/>
+          <p:cNvSpPr>
+            <a:spLocks noChangeAspect="1"/>
+          </p:cNvSpPr>
+          <p:nvPr/>
+        </p:nvSpPr>
+        <p:spPr>
+          <a:xfrm>
+            <a:off x="2510736" y="4787811"/>
+            <a:ext cx="170819" cy="169110"/>
+          </a:xfrm>
+          <a:prstGeom prst="ellipse">
+            <a:avLst/>
+          </a:prstGeom>
+        </p:spPr>
+        <p:style>
+          <a:lnRef idx="2">
+            <a:schemeClr val="accent1">
+              <a:shade val="50000"/>
+            </a:schemeClr>
+          </a:lnRef>
+          <a:fillRef idx="1">
+            <a:schemeClr val="accent1"/>
+          </a:fillRef>
+          <a:effectRef idx="0">
+            <a:schemeClr val="accent1"/>
+          </a:effectRef>
+          <a:fontRef idx="minor">
+            <a:schemeClr val="lt1"/>
+          </a:fontRef>
+        </p:style>
+        <p:txBody>
+          <a:bodyPr rtlCol="0" anchor="ctr"/>
+          <a:lstStyle/>
+          <a:p>
+            <a:pPr algn="ctr"/>
+            <a:endParaRPr lang="en-US" dirty="0"/>
+          </a:p>
+        </p:txBody>
+      </p:sp>
+      <p:sp>
+        <p:nvSpPr>
+          <p:cNvPr id="11" name="5-Point Star 10"/>
+          <p:cNvSpPr>
+            <a:spLocks noChangeAspect="1"/>
+          </p:cNvSpPr>
+          <p:nvPr/>
+        </p:nvSpPr>
+        <p:spPr>
+          <a:xfrm>
+            <a:off x="2515761" y="5062671"/>
+            <a:ext cx="165794" cy="169774"/>
+          </a:xfrm>
+          <a:prstGeom prst="star5">
+            <a:avLst/>
+          </a:prstGeom>
+        </p:spPr>
+        <p:style>
+          <a:lnRef idx="2">
+            <a:schemeClr val="accent1">
+              <a:shade val="50000"/>
+            </a:schemeClr>
+          </a:lnRef>
+          <a:fillRef idx="1">
+            <a:schemeClr val="accent1"/>
+          </a:fillRef>
+          <a:effectRef idx="0">
+            <a:schemeClr val="accent1"/>
+          </a:effectRef>
+          <a:fontRef idx="minor">
+            <a:schemeClr val="lt1"/>
+          </a:fontRef>
+        </p:style>
+        <p:txBody>
+          <a:bodyPr rtlCol="0" anchor="ctr"/>
+          <a:lstStyle/>
+          <a:p>
+            <a:pPr algn="ctr"/>
+            <a:endParaRPr lang="en-US" sz="1920"/>
+          </a:p>
+        </p:txBody>
+      </p:sp>
+      <p:sp>
+        <p:nvSpPr>
+          <p:cNvPr id="12" name="Isosceles Triangle 11"/>
+          <p:cNvSpPr>
+            <a:spLocks noChangeAspect="1"/>
+          </p:cNvSpPr>
+          <p:nvPr/>
+        </p:nvSpPr>
+        <p:spPr>
+          <a:xfrm>
+            <a:off x="2511168" y="5361169"/>
+            <a:ext cx="165467" cy="169110"/>
+          </a:xfrm>
+          <a:prstGeom prst="triangle">
+            <a:avLst/>
+          </a:prstGeom>
+        </p:spPr>
+        <p:style>
+          <a:lnRef idx="2">
+            <a:schemeClr val="accent1">
+              <a:shade val="50000"/>
+            </a:schemeClr>
+          </a:lnRef>
+          <a:fillRef idx="1">
+            <a:schemeClr val="accent1"/>
+          </a:fillRef>
+          <a:effectRef idx="0">
+            <a:schemeClr val="accent1"/>
+          </a:effectRef>
+          <a:fontRef idx="minor">
+            <a:schemeClr val="lt1"/>
+          </a:fontRef>
+        </p:style>
+        <p:txBody>
+          <a:bodyPr rtlCol="0" anchor="ctr"/>
           <a:lstStyle/>
           <a:p>
             <a:pPr algn="ctr"/>

</xml_diff>

<commit_message>
Was able to quickly replot the new values over the groves images.  Apparently I didn't save the right .in file for SEDT6, and I still have the data from SURF in place of it.  It looks a bit better, but we are still much farther off than we'd like.
</commit_message>
<xml_diff>
--- a/GrovesImagesWithData.pptx
+++ b/GrovesImagesWithData.pptx
@@ -257,7 +257,7 @@
           <a:p>
             <a:fld id="{7B82208D-E5F7-432D-B783-0485AA1D065E}" type="datetimeFigureOut">
               <a:rPr lang="en-US" smtClean="0"/>
-              <a:t>4/19/2016</a:t>
+              <a:t>5/2/2016</a:t>
             </a:fld>
             <a:endParaRPr lang="en-US"/>
           </a:p>
@@ -427,7 +427,7 @@
           <a:p>
             <a:fld id="{7B82208D-E5F7-432D-B783-0485AA1D065E}" type="datetimeFigureOut">
               <a:rPr lang="en-US" smtClean="0"/>
-              <a:t>4/19/2016</a:t>
+              <a:t>5/2/2016</a:t>
             </a:fld>
             <a:endParaRPr lang="en-US"/>
           </a:p>
@@ -607,7 +607,7 @@
           <a:p>
             <a:fld id="{7B82208D-E5F7-432D-B783-0485AA1D065E}" type="datetimeFigureOut">
               <a:rPr lang="en-US" smtClean="0"/>
-              <a:t>4/19/2016</a:t>
+              <a:t>5/2/2016</a:t>
             </a:fld>
             <a:endParaRPr lang="en-US"/>
           </a:p>
@@ -777,7 +777,7 @@
           <a:p>
             <a:fld id="{7B82208D-E5F7-432D-B783-0485AA1D065E}" type="datetimeFigureOut">
               <a:rPr lang="en-US" smtClean="0"/>
-              <a:t>4/19/2016</a:t>
+              <a:t>5/2/2016</a:t>
             </a:fld>
             <a:endParaRPr lang="en-US"/>
           </a:p>
@@ -1021,7 +1021,7 @@
           <a:p>
             <a:fld id="{7B82208D-E5F7-432D-B783-0485AA1D065E}" type="datetimeFigureOut">
               <a:rPr lang="en-US" smtClean="0"/>
-              <a:t>4/19/2016</a:t>
+              <a:t>5/2/2016</a:t>
             </a:fld>
             <a:endParaRPr lang="en-US"/>
           </a:p>
@@ -1253,7 +1253,7 @@
           <a:p>
             <a:fld id="{7B82208D-E5F7-432D-B783-0485AA1D065E}" type="datetimeFigureOut">
               <a:rPr lang="en-US" smtClean="0"/>
-              <a:t>4/19/2016</a:t>
+              <a:t>5/2/2016</a:t>
             </a:fld>
             <a:endParaRPr lang="en-US"/>
           </a:p>
@@ -1620,7 +1620,7 @@
           <a:p>
             <a:fld id="{7B82208D-E5F7-432D-B783-0485AA1D065E}" type="datetimeFigureOut">
               <a:rPr lang="en-US" smtClean="0"/>
-              <a:t>4/19/2016</a:t>
+              <a:t>5/2/2016</a:t>
             </a:fld>
             <a:endParaRPr lang="en-US"/>
           </a:p>
@@ -1738,7 +1738,7 @@
           <a:p>
             <a:fld id="{7B82208D-E5F7-432D-B783-0485AA1D065E}" type="datetimeFigureOut">
               <a:rPr lang="en-US" smtClean="0"/>
-              <a:t>4/19/2016</a:t>
+              <a:t>5/2/2016</a:t>
             </a:fld>
             <a:endParaRPr lang="en-US"/>
           </a:p>
@@ -1833,7 +1833,7 @@
           <a:p>
             <a:fld id="{7B82208D-E5F7-432D-B783-0485AA1D065E}" type="datetimeFigureOut">
               <a:rPr lang="en-US" smtClean="0"/>
-              <a:t>4/19/2016</a:t>
+              <a:t>5/2/2016</a:t>
             </a:fld>
             <a:endParaRPr lang="en-US"/>
           </a:p>
@@ -2110,7 +2110,7 @@
           <a:p>
             <a:fld id="{7B82208D-E5F7-432D-B783-0485AA1D065E}" type="datetimeFigureOut">
               <a:rPr lang="en-US" smtClean="0"/>
-              <a:t>4/19/2016</a:t>
+              <a:t>5/2/2016</a:t>
             </a:fld>
             <a:endParaRPr lang="en-US"/>
           </a:p>
@@ -2367,7 +2367,7 @@
           <a:p>
             <a:fld id="{7B82208D-E5F7-432D-B783-0485AA1D065E}" type="datetimeFigureOut">
               <a:rPr lang="en-US" smtClean="0"/>
-              <a:t>4/19/2016</a:t>
+              <a:t>5/2/2016</a:t>
             </a:fld>
             <a:endParaRPr lang="en-US"/>
           </a:p>
@@ -2580,7 +2580,7 @@
           <a:p>
             <a:fld id="{7B82208D-E5F7-432D-B783-0485AA1D065E}" type="datetimeFigureOut">
               <a:rPr lang="en-US" smtClean="0"/>
-              <a:t>4/19/2016</a:t>
+              <a:t>5/2/2016</a:t>
             </a:fld>
             <a:endParaRPr lang="en-US"/>
           </a:p>
@@ -3007,7 +3007,7 @@
         </p:blipFill>
         <p:spPr>
           <a:xfrm>
-            <a:off x="790448" y="707137"/>
+            <a:off x="565563" y="799500"/>
             <a:ext cx="8172704" cy="6067516"/>
           </a:xfrm>
           <a:prstGeom prst="rect">
@@ -3025,7 +3025,7 @@
         </p:nvSpPr>
         <p:spPr>
           <a:xfrm>
-            <a:off x="6444322" y="1713600"/>
+            <a:off x="6257175" y="1705240"/>
             <a:ext cx="136550" cy="136550"/>
           </a:xfrm>
           <a:prstGeom prst="rect">
@@ -3070,8 +3070,8 @@
         </p:nvSpPr>
         <p:spPr>
           <a:xfrm>
-            <a:off x="6415061" y="1841790"/>
-            <a:ext cx="165811" cy="165628"/>
+            <a:off x="6140799" y="1687887"/>
+            <a:ext cx="165811" cy="171255"/>
           </a:xfrm>
           <a:prstGeom prst="ellipse">
             <a:avLst/>
@@ -3112,7 +3112,7 @@
         </p:nvSpPr>
         <p:spPr>
           <a:xfrm>
-            <a:off x="6457734" y="1784679"/>
+            <a:off x="6197768" y="1859142"/>
             <a:ext cx="152400" cy="156058"/>
           </a:xfrm>
           <a:prstGeom prst="star5">
@@ -3154,7 +3154,7 @@
         </p:nvSpPr>
         <p:spPr>
           <a:xfrm>
-            <a:off x="6657159" y="1340657"/>
+            <a:off x="6452443" y="1340657"/>
             <a:ext cx="117043" cy="119620"/>
           </a:xfrm>
           <a:prstGeom prst="triangle">
@@ -3538,7 +3538,7 @@
         <p:nvPicPr>
           <p:cNvPr id="2" name="Picture 1"/>
           <p:cNvPicPr>
-            <a:picLocks noChangeAspect="1"/>
+            <a:picLocks/>
           </p:cNvPicPr>
           <p:nvPr/>
         </p:nvPicPr>
@@ -3556,8 +3556,8 @@
         </p:blipFill>
         <p:spPr>
           <a:xfrm>
-            <a:off x="972893" y="728472"/>
-            <a:ext cx="8074342" cy="5934456"/>
+            <a:off x="612674" y="894726"/>
+            <a:ext cx="8174736" cy="6071616"/>
           </a:xfrm>
           <a:prstGeom prst="rect">
             <a:avLst/>
@@ -3574,7 +3574,7 @@
         </p:nvSpPr>
         <p:spPr>
           <a:xfrm>
-            <a:off x="2341626" y="1672575"/>
+            <a:off x="2495918" y="1831375"/>
             <a:ext cx="169110" cy="169110"/>
           </a:xfrm>
           <a:prstGeom prst="rect">
@@ -3621,7 +3621,7 @@
         </p:nvSpPr>
         <p:spPr>
           <a:xfrm>
-            <a:off x="2514499" y="1920962"/>
+            <a:off x="2325099" y="2077606"/>
             <a:ext cx="170819" cy="169110"/>
           </a:xfrm>
           <a:prstGeom prst="ellipse">
@@ -3663,7 +3663,7 @@
         </p:nvSpPr>
         <p:spPr>
           <a:xfrm>
-            <a:off x="2602421" y="1836075"/>
+            <a:off x="2225014" y="1864567"/>
             <a:ext cx="165794" cy="169774"/>
           </a:xfrm>
           <a:prstGeom prst="star5">
@@ -3705,7 +3705,7 @@
         </p:nvSpPr>
         <p:spPr>
           <a:xfrm>
-            <a:off x="3308444" y="1268779"/>
+            <a:off x="3030958" y="1435033"/>
             <a:ext cx="165467" cy="169110"/>
           </a:xfrm>
           <a:prstGeom prst="triangle">
@@ -3745,7 +3745,7 @@
         </p:nvSpPr>
         <p:spPr>
           <a:xfrm>
-            <a:off x="2381104" y="4087536"/>
+            <a:off x="2020885" y="4253790"/>
             <a:ext cx="2185615" cy="1569660"/>
           </a:xfrm>
           <a:prstGeom prst="rect">
@@ -3899,7 +3899,7 @@
         </p:nvSpPr>
         <p:spPr>
           <a:xfrm>
-            <a:off x="2510874" y="4524795"/>
+            <a:off x="2150655" y="4691049"/>
             <a:ext cx="169110" cy="169110"/>
           </a:xfrm>
           <a:prstGeom prst="rect">
@@ -3946,7 +3946,7 @@
         </p:nvSpPr>
         <p:spPr>
           <a:xfrm>
-            <a:off x="2510736" y="4787811"/>
+            <a:off x="2150517" y="4954065"/>
             <a:ext cx="170819" cy="169110"/>
           </a:xfrm>
           <a:prstGeom prst="ellipse">
@@ -3988,7 +3988,7 @@
         </p:nvSpPr>
         <p:spPr>
           <a:xfrm>
-            <a:off x="2515761" y="5062671"/>
+            <a:off x="2155542" y="5228925"/>
             <a:ext cx="165794" cy="169774"/>
           </a:xfrm>
           <a:prstGeom prst="star5">
@@ -4030,7 +4030,7 @@
         </p:nvSpPr>
         <p:spPr>
           <a:xfrm>
-            <a:off x="2511168" y="5361169"/>
+            <a:off x="2150949" y="5527423"/>
             <a:ext cx="165467" cy="169110"/>
           </a:xfrm>
           <a:prstGeom prst="triangle">
@@ -4114,8 +4114,8 @@
         </p:blipFill>
         <p:spPr>
           <a:xfrm>
-            <a:off x="564396" y="801194"/>
-            <a:ext cx="7997875" cy="5937723"/>
+            <a:off x="564395" y="782721"/>
+            <a:ext cx="8174736" cy="6071616"/>
           </a:xfrm>
           <a:prstGeom prst="rect">
             <a:avLst/>
@@ -4132,8 +4132,8 @@
         </p:nvSpPr>
         <p:spPr>
           <a:xfrm>
-            <a:off x="5722597" y="1753912"/>
-            <a:ext cx="165811" cy="165811"/>
+            <a:off x="5889189" y="1671005"/>
+            <a:ext cx="165811" cy="157818"/>
           </a:xfrm>
           <a:prstGeom prst="rect">
             <a:avLst/>
@@ -4174,7 +4174,7 @@
         </p:nvSpPr>
         <p:spPr>
           <a:xfrm>
-            <a:off x="5722597" y="1915911"/>
+            <a:off x="5889190" y="1745918"/>
             <a:ext cx="165811" cy="165811"/>
           </a:xfrm>
           <a:prstGeom prst="ellipse">
@@ -4216,7 +4216,7 @@
         </p:nvSpPr>
         <p:spPr>
           <a:xfrm>
-            <a:off x="5806287" y="1745919"/>
+            <a:off x="5972097" y="1828824"/>
             <a:ext cx="165811" cy="165811"/>
           </a:xfrm>
           <a:prstGeom prst="star5">
@@ -4258,7 +4258,7 @@
         </p:nvSpPr>
         <p:spPr>
           <a:xfrm>
-            <a:off x="5547098" y="1424195"/>
+            <a:off x="5622161" y="1383252"/>
             <a:ext cx="175499" cy="165811"/>
           </a:xfrm>
           <a:prstGeom prst="triangle">

</xml_diff>